<commit_message>
Updated RobotDrive slides. Moved files around.
</commit_message>
<xml_diff>
--- a/Lesson5/RobotDrive.pptx
+++ b/Lesson5/RobotDrive.pptx
@@ -5,22 +5,23 @@
     <p:sldMasterId id="2147483648" r:id="rId1"/>
   </p:sldMasterIdLst>
   <p:notesMasterIdLst>
-    <p:notesMasterId r:id="rId15"/>
+    <p:notesMasterId r:id="rId16"/>
   </p:notesMasterIdLst>
   <p:sldIdLst>
     <p:sldId id="266" r:id="rId2"/>
     <p:sldId id="274" r:id="rId3"/>
     <p:sldId id="324" r:id="rId4"/>
     <p:sldId id="293" r:id="rId5"/>
-    <p:sldId id="326" r:id="rId6"/>
-    <p:sldId id="277" r:id="rId7"/>
-    <p:sldId id="327" r:id="rId8"/>
-    <p:sldId id="283" r:id="rId9"/>
-    <p:sldId id="284" r:id="rId10"/>
-    <p:sldId id="328" r:id="rId11"/>
-    <p:sldId id="278" r:id="rId12"/>
-    <p:sldId id="279" r:id="rId13"/>
-    <p:sldId id="285" r:id="rId14"/>
+    <p:sldId id="278" r:id="rId6"/>
+    <p:sldId id="279" r:id="rId7"/>
+    <p:sldId id="285" r:id="rId8"/>
+    <p:sldId id="326" r:id="rId9"/>
+    <p:sldId id="277" r:id="rId10"/>
+    <p:sldId id="327" r:id="rId11"/>
+    <p:sldId id="283" r:id="rId12"/>
+    <p:sldId id="284" r:id="rId13"/>
+    <p:sldId id="328" r:id="rId14"/>
+    <p:sldId id="329" r:id="rId15"/>
   </p:sldIdLst>
   <p:sldSz cx="12192000" cy="6858000"/>
   <p:notesSz cx="6858000" cy="9144000"/>
@@ -13751,7 +13752,7 @@
           <p:cNvPr id="2" name="Title 1">
             <a:extLst>
               <a:ext uri="{FF2B5EF4-FFF2-40B4-BE49-F238E27FC236}">
-                <a16:creationId xmlns:a16="http://schemas.microsoft.com/office/drawing/2014/main" id="{7EF6B6A5-823D-42D9-A995-64CE913A925F}"/>
+                <a16:creationId xmlns:a16="http://schemas.microsoft.com/office/drawing/2014/main" id="{09F4C2DE-1E97-4D6C-B924-24333C07B33A}"/>
               </a:ext>
             </a:extLst>
           </p:cNvPr>
@@ -13762,19 +13763,14 @@
             <p:ph type="title"/>
           </p:nvPr>
         </p:nvSpPr>
-        <p:spPr>
-          <a:xfrm>
-            <a:off x="503339" y="973668"/>
-            <a:ext cx="10410737" cy="706964"/>
-          </a:xfrm>
-        </p:spPr>
+        <p:spPr/>
         <p:txBody>
           <a:bodyPr/>
           <a:lstStyle/>
           <a:p>
             <a:r>
               <a:rPr lang="en-US" dirty="0"/>
-              <a:t>Exercise: Drive Robot Through a Slalom Path</a:t>
+              <a:t>Using Pure Pursuit Drive</a:t>
             </a:r>
           </a:p>
         </p:txBody>
@@ -13784,7 +13780,7 @@
           <p:cNvPr id="3" name="Content Placeholder 2">
             <a:extLst>
               <a:ext uri="{FF2B5EF4-FFF2-40B4-BE49-F238E27FC236}">
-                <a16:creationId xmlns:a16="http://schemas.microsoft.com/office/drawing/2014/main" id="{097A9A0A-0F06-4864-AD5C-3C7501CDEDFD}"/>
+                <a16:creationId xmlns:a16="http://schemas.microsoft.com/office/drawing/2014/main" id="{EA1D6505-D893-49E8-8118-580F873467C0}"/>
               </a:ext>
             </a:extLst>
           </p:cNvPr>
@@ -13797,8 +13793,8 @@
         </p:nvSpPr>
         <p:spPr>
           <a:xfrm>
-            <a:off x="503340" y="2265028"/>
-            <a:ext cx="11115412" cy="4410092"/>
+            <a:off x="553673" y="2273417"/>
+            <a:ext cx="11039911" cy="4477007"/>
           </a:xfrm>
         </p:spPr>
         <p:txBody>
@@ -13808,186 +13804,686 @@
           <a:lstStyle/>
           <a:p>
             <a:r>
-              <a:rPr lang="en-US" dirty="0"/>
-              <a:t>Navigate the robot through a slalom path using Pure Pursuit Drive.</a:t>
-            </a:r>
-          </a:p>
-          <a:p>
-            <a:pPr lvl="1"/>
-            <a:r>
-              <a:rPr lang="en-US" dirty="0"/>
-              <a:t>In previous exercises, you have already created a </a:t>
-            </a:r>
-            <a:r>
-              <a:rPr lang="en-US" dirty="0" err="1"/>
-              <a:t>mecanum</a:t>
-            </a:r>
-            <a:r>
-              <a:rPr lang="en-US" dirty="0"/>
-              <a:t> drive base.</a:t>
-            </a:r>
-          </a:p>
-          <a:p>
-            <a:pPr lvl="1"/>
-            <a:r>
-              <a:rPr lang="en-US" dirty="0"/>
-              <a:t>In Robot.java, add code to the </a:t>
-            </a:r>
-            <a:r>
-              <a:rPr lang="en-US" dirty="0" err="1"/>
-              <a:t>robotInit</a:t>
-            </a:r>
-            <a:r>
-              <a:rPr lang="en-US" dirty="0"/>
-              <a:t> method to create the </a:t>
-            </a:r>
-            <a:r>
-              <a:rPr lang="en-US" dirty="0" err="1"/>
-              <a:t>purePursuitDrive</a:t>
-            </a:r>
-            <a:r>
-              <a:rPr lang="en-US" dirty="0"/>
-              <a:t> (</a:t>
-            </a:r>
-            <a:r>
               <a:rPr lang="en-US" dirty="0" err="1"/>
               <a:t>TrcPurePursuitDrive</a:t>
             </a:r>
             <a:r>
               <a:rPr lang="en-US" dirty="0"/>
-              <a:t>), specifying a name, the </a:t>
-            </a:r>
+              <a:t> Constructor:</a:t>
+            </a:r>
+            <a:br>
+              <a:rPr lang="en-US" dirty="0"/>
+            </a:br>
+            <a:r>
+              <a:rPr lang="en-US" b="0" dirty="0" err="1">
+                <a:solidFill>
+                  <a:srgbClr val="DCDCAA"/>
+                </a:solidFill>
+                <a:effectLst/>
+                <a:latin typeface="Consolas" panose="020B0609020204030204" pitchFamily="49" charset="0"/>
+              </a:rPr>
+              <a:t>TrcPurePursuitDrive</a:t>
+            </a:r>
+            <a:r>
+              <a:rPr lang="en-US" b="0" dirty="0">
+                <a:solidFill>
+                  <a:srgbClr val="D4D4D4"/>
+                </a:solidFill>
+                <a:effectLst/>
+                <a:latin typeface="Consolas" panose="020B0609020204030204" pitchFamily="49" charset="0"/>
+              </a:rPr>
+              <a:t>(</a:t>
+            </a:r>
+            <a:r>
+              <a:rPr lang="en-US" b="0" dirty="0">
+                <a:solidFill>
+                  <a:srgbClr val="4EC9B0"/>
+                </a:solidFill>
+                <a:effectLst/>
+                <a:latin typeface="Consolas" panose="020B0609020204030204" pitchFamily="49" charset="0"/>
+              </a:rPr>
+              <a:t>String</a:t>
+            </a:r>
+            <a:r>
+              <a:rPr lang="en-US" b="0" dirty="0">
+                <a:solidFill>
+                  <a:srgbClr val="D4D4D4"/>
+                </a:solidFill>
+                <a:effectLst/>
+                <a:latin typeface="Consolas" panose="020B0609020204030204" pitchFamily="49" charset="0"/>
+              </a:rPr>
+              <a:t> </a:t>
+            </a:r>
+            <a:r>
+              <a:rPr lang="en-US" b="0" dirty="0" err="1">
+                <a:solidFill>
+                  <a:srgbClr val="9CDCFE"/>
+                </a:solidFill>
+                <a:effectLst/>
+                <a:latin typeface="Consolas" panose="020B0609020204030204" pitchFamily="49" charset="0"/>
+              </a:rPr>
+              <a:t>instanceName</a:t>
+            </a:r>
+            <a:r>
+              <a:rPr lang="en-US" b="0" dirty="0">
+                <a:solidFill>
+                  <a:srgbClr val="D4D4D4"/>
+                </a:solidFill>
+                <a:effectLst/>
+                <a:latin typeface="Consolas" panose="020B0609020204030204" pitchFamily="49" charset="0"/>
+              </a:rPr>
+              <a:t>, </a:t>
+            </a:r>
+            <a:r>
+              <a:rPr lang="en-US" b="0" dirty="0" err="1">
+                <a:solidFill>
+                  <a:srgbClr val="4EC9B0"/>
+                </a:solidFill>
+                <a:effectLst/>
+                <a:latin typeface="Consolas" panose="020B0609020204030204" pitchFamily="49" charset="0"/>
+              </a:rPr>
+              <a:t>TrcDriveBase</a:t>
+            </a:r>
+            <a:r>
+              <a:rPr lang="en-US" b="0" dirty="0">
+                <a:solidFill>
+                  <a:srgbClr val="D4D4D4"/>
+                </a:solidFill>
+                <a:effectLst/>
+                <a:latin typeface="Consolas" panose="020B0609020204030204" pitchFamily="49" charset="0"/>
+              </a:rPr>
+              <a:t> </a:t>
+            </a:r>
+            <a:r>
+              <a:rPr lang="en-US" b="0" dirty="0" err="1">
+                <a:solidFill>
+                  <a:srgbClr val="9CDCFE"/>
+                </a:solidFill>
+                <a:effectLst/>
+                <a:latin typeface="Consolas" panose="020B0609020204030204" pitchFamily="49" charset="0"/>
+              </a:rPr>
+              <a:t>driveBase</a:t>
+            </a:r>
+            <a:r>
+              <a:rPr lang="en-US" b="0" dirty="0">
+                <a:solidFill>
+                  <a:srgbClr val="D4D4D4"/>
+                </a:solidFill>
+                <a:effectLst/>
+                <a:latin typeface="Consolas" panose="020B0609020204030204" pitchFamily="49" charset="0"/>
+              </a:rPr>
+              <a:t>, </a:t>
+            </a:r>
+            <a:r>
+              <a:rPr lang="en-US" b="0" dirty="0">
+                <a:solidFill>
+                  <a:srgbClr val="4EC9B0"/>
+                </a:solidFill>
+                <a:effectLst/>
+                <a:latin typeface="Consolas" panose="020B0609020204030204" pitchFamily="49" charset="0"/>
+              </a:rPr>
+              <a:t>double</a:t>
+            </a:r>
+            <a:r>
+              <a:rPr lang="en-US" b="0" dirty="0">
+                <a:solidFill>
+                  <a:srgbClr val="D4D4D4"/>
+                </a:solidFill>
+                <a:effectLst/>
+                <a:latin typeface="Consolas" panose="020B0609020204030204" pitchFamily="49" charset="0"/>
+              </a:rPr>
+              <a:t> </a:t>
+            </a:r>
+            <a:r>
+              <a:rPr lang="en-US" b="0" dirty="0" err="1">
+                <a:solidFill>
+                  <a:srgbClr val="9CDCFE"/>
+                </a:solidFill>
+                <a:effectLst/>
+                <a:latin typeface="Consolas" panose="020B0609020204030204" pitchFamily="49" charset="0"/>
+              </a:rPr>
+              <a:t>proximityRadius</a:t>
+            </a:r>
+            <a:r>
+              <a:rPr lang="en-US" b="0" dirty="0">
+                <a:solidFill>
+                  <a:srgbClr val="D4D4D4"/>
+                </a:solidFill>
+                <a:effectLst/>
+                <a:latin typeface="Consolas" panose="020B0609020204030204" pitchFamily="49" charset="0"/>
+              </a:rPr>
+              <a:t>, </a:t>
+            </a:r>
+            <a:r>
+              <a:rPr lang="en-US" b="0" dirty="0">
+                <a:solidFill>
+                  <a:srgbClr val="4EC9B0"/>
+                </a:solidFill>
+                <a:effectLst/>
+                <a:latin typeface="Consolas" panose="020B0609020204030204" pitchFamily="49" charset="0"/>
+              </a:rPr>
+              <a:t>double</a:t>
+            </a:r>
+            <a:r>
+              <a:rPr lang="en-US" b="0" dirty="0">
+                <a:solidFill>
+                  <a:srgbClr val="D4D4D4"/>
+                </a:solidFill>
+                <a:effectLst/>
+                <a:latin typeface="Consolas" panose="020B0609020204030204" pitchFamily="49" charset="0"/>
+              </a:rPr>
+              <a:t> </a:t>
+            </a:r>
+            <a:r>
+              <a:rPr lang="en-US" b="0" dirty="0" err="1">
+                <a:solidFill>
+                  <a:srgbClr val="9CDCFE"/>
+                </a:solidFill>
+                <a:effectLst/>
+                <a:latin typeface="Consolas" panose="020B0609020204030204" pitchFamily="49" charset="0"/>
+              </a:rPr>
+              <a:t>posTolerance</a:t>
+            </a:r>
+            <a:r>
+              <a:rPr lang="en-US" b="0" dirty="0">
+                <a:solidFill>
+                  <a:srgbClr val="D4D4D4"/>
+                </a:solidFill>
+                <a:effectLst/>
+                <a:latin typeface="Consolas" panose="020B0609020204030204" pitchFamily="49" charset="0"/>
+              </a:rPr>
+              <a:t>, </a:t>
+            </a:r>
+            <a:r>
+              <a:rPr lang="en-US" b="0" dirty="0">
+                <a:solidFill>
+                  <a:srgbClr val="4EC9B0"/>
+                </a:solidFill>
+                <a:effectLst/>
+                <a:latin typeface="Consolas" panose="020B0609020204030204" pitchFamily="49" charset="0"/>
+              </a:rPr>
+              <a:t>double</a:t>
+            </a:r>
+            <a:r>
+              <a:rPr lang="en-US" b="0" dirty="0">
+                <a:solidFill>
+                  <a:srgbClr val="D4D4D4"/>
+                </a:solidFill>
+                <a:effectLst/>
+                <a:latin typeface="Consolas" panose="020B0609020204030204" pitchFamily="49" charset="0"/>
+              </a:rPr>
+              <a:t> </a:t>
+            </a:r>
+            <a:r>
+              <a:rPr lang="en-US" b="0" dirty="0" err="1">
+                <a:solidFill>
+                  <a:srgbClr val="9CDCFE"/>
+                </a:solidFill>
+                <a:effectLst/>
+                <a:latin typeface="Consolas" panose="020B0609020204030204" pitchFamily="49" charset="0"/>
+              </a:rPr>
+              <a:t>turnTolerance</a:t>
+            </a:r>
+            <a:r>
+              <a:rPr lang="en-US" b="0" dirty="0">
+                <a:solidFill>
+                  <a:srgbClr val="D4D4D4"/>
+                </a:solidFill>
+                <a:effectLst/>
+                <a:latin typeface="Consolas" panose="020B0609020204030204" pitchFamily="49" charset="0"/>
+              </a:rPr>
+              <a:t>, </a:t>
+            </a:r>
+            <a:r>
+              <a:rPr lang="en-US" b="0" dirty="0" err="1">
+                <a:solidFill>
+                  <a:srgbClr val="4EC9B0"/>
+                </a:solidFill>
+                <a:effectLst/>
+                <a:latin typeface="Consolas" panose="020B0609020204030204" pitchFamily="49" charset="0"/>
+              </a:rPr>
+              <a:t>TrcPidController</a:t>
+            </a:r>
+            <a:r>
+              <a:rPr lang="en-US" b="0" dirty="0" err="1">
+                <a:solidFill>
+                  <a:srgbClr val="D4D4D4"/>
+                </a:solidFill>
+                <a:effectLst/>
+                <a:latin typeface="Consolas" panose="020B0609020204030204" pitchFamily="49" charset="0"/>
+              </a:rPr>
+              <a:t>.</a:t>
+            </a:r>
+            <a:r>
+              <a:rPr lang="en-US" b="0" dirty="0" err="1">
+                <a:solidFill>
+                  <a:srgbClr val="4EC9B0"/>
+                </a:solidFill>
+                <a:effectLst/>
+                <a:latin typeface="Consolas" panose="020B0609020204030204" pitchFamily="49" charset="0"/>
+              </a:rPr>
+              <a:t>PidCoefficients</a:t>
+            </a:r>
+            <a:r>
+              <a:rPr lang="en-US" b="0" dirty="0">
+                <a:solidFill>
+                  <a:srgbClr val="D4D4D4"/>
+                </a:solidFill>
+                <a:effectLst/>
+                <a:latin typeface="Consolas" panose="020B0609020204030204" pitchFamily="49" charset="0"/>
+              </a:rPr>
+              <a:t> </a:t>
+            </a:r>
+            <a:r>
+              <a:rPr lang="en-US" b="0" dirty="0" err="1">
+                <a:solidFill>
+                  <a:srgbClr val="9CDCFE"/>
+                </a:solidFill>
+                <a:effectLst/>
+                <a:latin typeface="Consolas" panose="020B0609020204030204" pitchFamily="49" charset="0"/>
+              </a:rPr>
+              <a:t>xPosPidCoeff</a:t>
+            </a:r>
+            <a:r>
+              <a:rPr lang="en-US" b="0" dirty="0">
+                <a:solidFill>
+                  <a:srgbClr val="D4D4D4"/>
+                </a:solidFill>
+                <a:effectLst/>
+                <a:latin typeface="Consolas" panose="020B0609020204030204" pitchFamily="49" charset="0"/>
+              </a:rPr>
+              <a:t>, </a:t>
+            </a:r>
+            <a:r>
+              <a:rPr lang="en-US" b="0" dirty="0" err="1">
+                <a:solidFill>
+                  <a:srgbClr val="4EC9B0"/>
+                </a:solidFill>
+                <a:effectLst/>
+                <a:latin typeface="Consolas" panose="020B0609020204030204" pitchFamily="49" charset="0"/>
+              </a:rPr>
+              <a:t>TrcPidController</a:t>
+            </a:r>
+            <a:r>
+              <a:rPr lang="en-US" b="0" dirty="0" err="1">
+                <a:solidFill>
+                  <a:srgbClr val="D4D4D4"/>
+                </a:solidFill>
+                <a:effectLst/>
+                <a:latin typeface="Consolas" panose="020B0609020204030204" pitchFamily="49" charset="0"/>
+              </a:rPr>
+              <a:t>.</a:t>
+            </a:r>
+            <a:r>
+              <a:rPr lang="en-US" b="0" dirty="0" err="1">
+                <a:solidFill>
+                  <a:srgbClr val="4EC9B0"/>
+                </a:solidFill>
+                <a:effectLst/>
+                <a:latin typeface="Consolas" panose="020B0609020204030204" pitchFamily="49" charset="0"/>
+              </a:rPr>
+              <a:t>PidCoefficients</a:t>
+            </a:r>
+            <a:r>
+              <a:rPr lang="en-US" b="0" dirty="0">
+                <a:solidFill>
+                  <a:srgbClr val="D4D4D4"/>
+                </a:solidFill>
+                <a:effectLst/>
+                <a:latin typeface="Consolas" panose="020B0609020204030204" pitchFamily="49" charset="0"/>
+              </a:rPr>
+              <a:t> </a:t>
+            </a:r>
+            <a:r>
+              <a:rPr lang="en-US" b="0" dirty="0" err="1">
+                <a:solidFill>
+                  <a:srgbClr val="9CDCFE"/>
+                </a:solidFill>
+                <a:effectLst/>
+                <a:latin typeface="Consolas" panose="020B0609020204030204" pitchFamily="49" charset="0"/>
+              </a:rPr>
+              <a:t>yPosPidCoeff</a:t>
+            </a:r>
+            <a:r>
+              <a:rPr lang="en-US" b="0" dirty="0">
+                <a:solidFill>
+                  <a:srgbClr val="D4D4D4"/>
+                </a:solidFill>
+                <a:effectLst/>
+                <a:latin typeface="Consolas" panose="020B0609020204030204" pitchFamily="49" charset="0"/>
+              </a:rPr>
+              <a:t>, </a:t>
+            </a:r>
+            <a:r>
+              <a:rPr lang="en-US" b="0" dirty="0" err="1">
+                <a:solidFill>
+                  <a:srgbClr val="4EC9B0"/>
+                </a:solidFill>
+                <a:effectLst/>
+                <a:latin typeface="Consolas" panose="020B0609020204030204" pitchFamily="49" charset="0"/>
+              </a:rPr>
+              <a:t>TrcPidController</a:t>
+            </a:r>
+            <a:r>
+              <a:rPr lang="en-US" b="0" dirty="0" err="1">
+                <a:solidFill>
+                  <a:srgbClr val="D4D4D4"/>
+                </a:solidFill>
+                <a:effectLst/>
+                <a:latin typeface="Consolas" panose="020B0609020204030204" pitchFamily="49" charset="0"/>
+              </a:rPr>
+              <a:t>.</a:t>
+            </a:r>
+            <a:r>
+              <a:rPr lang="en-US" b="0" dirty="0" err="1">
+                <a:solidFill>
+                  <a:srgbClr val="4EC9B0"/>
+                </a:solidFill>
+                <a:effectLst/>
+                <a:latin typeface="Consolas" panose="020B0609020204030204" pitchFamily="49" charset="0"/>
+              </a:rPr>
+              <a:t>PidCoefficients</a:t>
+            </a:r>
+            <a:r>
+              <a:rPr lang="en-US" b="0" dirty="0">
+                <a:solidFill>
+                  <a:srgbClr val="D4D4D4"/>
+                </a:solidFill>
+                <a:effectLst/>
+                <a:latin typeface="Consolas" panose="020B0609020204030204" pitchFamily="49" charset="0"/>
+              </a:rPr>
+              <a:t> </a:t>
+            </a:r>
+            <a:r>
+              <a:rPr lang="en-US" b="0" dirty="0" err="1">
+                <a:solidFill>
+                  <a:srgbClr val="9CDCFE"/>
+                </a:solidFill>
+                <a:effectLst/>
+                <a:latin typeface="Consolas" panose="020B0609020204030204" pitchFamily="49" charset="0"/>
+              </a:rPr>
+              <a:t>turnPidCoeff</a:t>
+            </a:r>
+            <a:r>
+              <a:rPr lang="en-US" b="0" dirty="0">
+                <a:solidFill>
+                  <a:srgbClr val="D4D4D4"/>
+                </a:solidFill>
+                <a:effectLst/>
+                <a:latin typeface="Consolas" panose="020B0609020204030204" pitchFamily="49" charset="0"/>
+              </a:rPr>
+              <a:t>, </a:t>
+            </a:r>
+            <a:r>
+              <a:rPr lang="en-US" b="0" dirty="0" err="1">
+                <a:solidFill>
+                  <a:srgbClr val="4EC9B0"/>
+                </a:solidFill>
+                <a:effectLst/>
+                <a:latin typeface="Consolas" panose="020B0609020204030204" pitchFamily="49" charset="0"/>
+              </a:rPr>
+              <a:t>TrcPidController</a:t>
+            </a:r>
+            <a:r>
+              <a:rPr lang="en-US" b="0" dirty="0" err="1">
+                <a:solidFill>
+                  <a:srgbClr val="D4D4D4"/>
+                </a:solidFill>
+                <a:effectLst/>
+                <a:latin typeface="Consolas" panose="020B0609020204030204" pitchFamily="49" charset="0"/>
+              </a:rPr>
+              <a:t>.</a:t>
+            </a:r>
+            <a:r>
+              <a:rPr lang="en-US" b="0" dirty="0" err="1">
+                <a:solidFill>
+                  <a:srgbClr val="4EC9B0"/>
+                </a:solidFill>
+                <a:effectLst/>
+                <a:latin typeface="Consolas" panose="020B0609020204030204" pitchFamily="49" charset="0"/>
+              </a:rPr>
+              <a:t>PidCoefficients</a:t>
+            </a:r>
+            <a:r>
+              <a:rPr lang="en-US" b="0" dirty="0">
+                <a:solidFill>
+                  <a:srgbClr val="D4D4D4"/>
+                </a:solidFill>
+                <a:effectLst/>
+                <a:latin typeface="Consolas" panose="020B0609020204030204" pitchFamily="49" charset="0"/>
+              </a:rPr>
+              <a:t> </a:t>
+            </a:r>
+            <a:r>
+              <a:rPr lang="en-US" b="0" dirty="0" err="1">
+                <a:solidFill>
+                  <a:srgbClr val="9CDCFE"/>
+                </a:solidFill>
+                <a:effectLst/>
+                <a:latin typeface="Consolas" panose="020B0609020204030204" pitchFamily="49" charset="0"/>
+              </a:rPr>
+              <a:t>velPidCoeff</a:t>
+            </a:r>
+            <a:r>
+              <a:rPr lang="en-US" b="0" dirty="0">
+                <a:solidFill>
+                  <a:srgbClr val="D4D4D4"/>
+                </a:solidFill>
+                <a:effectLst/>
+                <a:latin typeface="Consolas" panose="020B0609020204030204" pitchFamily="49" charset="0"/>
+              </a:rPr>
+              <a:t>)</a:t>
+            </a:r>
+            <a:endParaRPr lang="en-US" dirty="0"/>
+          </a:p>
+          <a:p>
+            <a:r>
+              <a:rPr lang="en-US" dirty="0"/>
+              <a:t>Methods:</a:t>
+            </a:r>
+          </a:p>
+          <a:p>
+            <a:pPr lvl="1"/>
+            <a:r>
+              <a:rPr lang="en-US" dirty="0"/>
+              <a:t>Some setter methods to set various parameters of Pure Pursuit Drive: e.g. following distance, tolerances, PID coefficients, interpolation types etc.</a:t>
+            </a:r>
+          </a:p>
+          <a:p>
+            <a:pPr lvl="1"/>
             <a:r>
               <a:rPr lang="en-US" dirty="0" err="1"/>
-              <a:t>mecanum</a:t>
-            </a:r>
-            <a:r>
-              <a:rPr lang="en-US" dirty="0"/>
-              <a:t> drive base, </a:t>
-            </a:r>
-            <a:r>
-              <a:rPr lang="en-US" dirty="0" err="1"/>
-              <a:t>proximityRadius</a:t>
-            </a:r>
-            <a:r>
-              <a:rPr lang="en-US" dirty="0"/>
-              <a:t> set to 12.0, </a:t>
-            </a:r>
-            <a:r>
-              <a:rPr lang="en-US" dirty="0" err="1"/>
-              <a:t>posTolerance</a:t>
-            </a:r>
-            <a:r>
-              <a:rPr lang="en-US" dirty="0"/>
-              <a:t> set to 2.0, </a:t>
-            </a:r>
-            <a:r>
-              <a:rPr lang="en-US" dirty="0" err="1"/>
-              <a:t>turnTolerance</a:t>
-            </a:r>
-            <a:r>
-              <a:rPr lang="en-US" dirty="0"/>
-              <a:t> set to 2.0 and the PID coefficients for the four PID controllers (</a:t>
-            </a:r>
-            <a:r>
-              <a:rPr lang="en-US" dirty="0" err="1"/>
-              <a:t>XPos</a:t>
-            </a:r>
-            <a:r>
-              <a:rPr lang="en-US" dirty="0"/>
+              <a:t>isActive</a:t>
+            </a:r>
+            <a:r>
+              <a:rPr lang="en-US" dirty="0"/>
+              <a:t> – check if Pure Pursuit Drive is in progress.</a:t>
+            </a:r>
+          </a:p>
+          <a:p>
+            <a:pPr lvl="1"/>
+            <a:r>
+              <a:rPr lang="en-US" dirty="0"/>
+              <a:t>cancel – cancel the Pure Pursuit Drive that is in progress.</a:t>
+            </a:r>
+          </a:p>
+          <a:p>
+            <a:pPr lvl="1"/>
+            <a:r>
+              <a:rPr lang="en-US" dirty="0"/>
+              <a:t>start – start the pure pursuit drive with the specified path.</a:t>
+            </a:r>
+            <a:br>
+              <a:rPr lang="en-US" dirty="0"/>
+            </a:br>
+            <a:r>
+              <a:rPr lang="en-US" b="0" dirty="0">
+                <a:solidFill>
+                  <a:srgbClr val="4EC9B0"/>
+                </a:solidFill>
+                <a:effectLst/>
+                <a:latin typeface="Consolas" panose="020B0609020204030204" pitchFamily="49" charset="0"/>
+              </a:rPr>
+              <a:t>void</a:t>
+            </a:r>
+            <a:r>
+              <a:rPr lang="en-US" b="0" dirty="0">
+                <a:solidFill>
+                  <a:srgbClr val="D4D4D4"/>
+                </a:solidFill>
+                <a:effectLst/>
+                <a:latin typeface="Consolas" panose="020B0609020204030204" pitchFamily="49" charset="0"/>
+              </a:rPr>
+              <a:t> </a:t>
+            </a:r>
+            <a:r>
+              <a:rPr lang="en-US" b="0" dirty="0">
+                <a:solidFill>
+                  <a:srgbClr val="DCDCAA"/>
+                </a:solidFill>
+                <a:effectLst/>
+                <a:latin typeface="Consolas" panose="020B0609020204030204" pitchFamily="49" charset="0"/>
+              </a:rPr>
+              <a:t>start</a:t>
+            </a:r>
+            <a:r>
+              <a:rPr lang="en-US" b="0" dirty="0">
+                <a:solidFill>
+                  <a:srgbClr val="D4D4D4"/>
+                </a:solidFill>
+                <a:effectLst/>
+                <a:latin typeface="Consolas" panose="020B0609020204030204" pitchFamily="49" charset="0"/>
+              </a:rPr>
+              <a:t>(</a:t>
+            </a:r>
+            <a:r>
+              <a:rPr lang="en-US" b="0" dirty="0" err="1">
+                <a:solidFill>
+                  <a:srgbClr val="4EC9B0"/>
+                </a:solidFill>
+                <a:effectLst/>
+                <a:latin typeface="Consolas" panose="020B0609020204030204" pitchFamily="49" charset="0"/>
+              </a:rPr>
+              <a:t>TrcPath</a:t>
+            </a:r>
+            <a:r>
+              <a:rPr lang="en-US" b="0" dirty="0">
+                <a:solidFill>
+                  <a:srgbClr val="D4D4D4"/>
+                </a:solidFill>
+                <a:effectLst/>
+                <a:latin typeface="Consolas" panose="020B0609020204030204" pitchFamily="49" charset="0"/>
+              </a:rPr>
+              <a:t> </a:t>
+            </a:r>
+            <a:r>
+              <a:rPr lang="en-US" b="0" dirty="0">
+                <a:solidFill>
+                  <a:srgbClr val="9CDCFE"/>
+                </a:solidFill>
+                <a:effectLst/>
+                <a:latin typeface="Consolas" panose="020B0609020204030204" pitchFamily="49" charset="0"/>
+              </a:rPr>
+              <a:t>path</a:t>
+            </a:r>
+            <a:r>
+              <a:rPr lang="en-US" b="0" dirty="0">
+                <a:solidFill>
+                  <a:srgbClr val="D4D4D4"/>
+                </a:solidFill>
+                <a:effectLst/>
+                <a:latin typeface="Consolas" panose="020B0609020204030204" pitchFamily="49" charset="0"/>
+              </a:rPr>
               <a:t>, </a:t>
             </a:r>
             <a:r>
-              <a:rPr lang="en-US" dirty="0" err="1"/>
-              <a:t>YPos</a:t>
-            </a:r>
-            <a:r>
-              <a:rPr lang="en-US" dirty="0"/>
-              <a:t>, Rotation and Velocity).</a:t>
-            </a:r>
-          </a:p>
-          <a:p>
-            <a:pPr lvl="1"/>
-            <a:r>
-              <a:rPr lang="en-US" dirty="0"/>
-              <a:t>Enable fast mode by calling </a:t>
-            </a:r>
-            <a:r>
-              <a:rPr lang="en-US" dirty="0" err="1"/>
-              <a:t>purePursuitDrive.setFastModeEnabled</a:t>
-            </a:r>
-            <a:r>
-              <a:rPr lang="en-US" dirty="0"/>
-              <a:t>(true).</a:t>
-            </a:r>
-          </a:p>
-          <a:p>
-            <a:pPr lvl="1"/>
-            <a:r>
-              <a:rPr lang="en-US" dirty="0"/>
-              <a:t>In </a:t>
-            </a:r>
-            <a:r>
-              <a:rPr lang="en-US" dirty="0" err="1"/>
-              <a:t>FrcTeleOp</a:t>
-            </a:r>
-            <a:r>
-              <a:rPr lang="en-US" dirty="0"/>
-              <a:t>, add code to the </a:t>
-            </a:r>
-            <a:r>
-              <a:rPr lang="en-US" dirty="0" err="1"/>
-              <a:t>startMode</a:t>
-            </a:r>
-            <a:r>
-              <a:rPr lang="en-US" dirty="0"/>
-              <a:t> method to set the initial robot position to the field position of (x=72.0, y=9.0, angle=0.0). (Hint: </a:t>
-            </a:r>
-            <a:r>
-              <a:rPr lang="en-US" dirty="0" err="1"/>
-              <a:t>driveBase.setFieldPosition</a:t>
-            </a:r>
-            <a:r>
-              <a:rPr lang="en-US" dirty="0"/>
-              <a:t>).</a:t>
-            </a:r>
-          </a:p>
-          <a:p>
-            <a:pPr lvl="1"/>
-            <a:r>
-              <a:rPr lang="en-US" dirty="0"/>
-              <a:t>Add code to </a:t>
-            </a:r>
-            <a:r>
-              <a:rPr lang="en-US" dirty="0" err="1"/>
-              <a:t>driverControllerButtonEvent</a:t>
-            </a:r>
-            <a:r>
-              <a:rPr lang="en-US" dirty="0"/>
-              <a:t> method to perform the pure pursuit drive (</a:t>
-            </a:r>
-            <a:r>
-              <a:rPr lang="en-US" dirty="0" err="1"/>
-              <a:t>purePursuitDrive.start</a:t>
-            </a:r>
-            <a:r>
-              <a:rPr lang="en-US" dirty="0"/>
-              <a:t>) when button A is pressed and print a message on the dashboard to report the button event. The slalom path has 9 relative waypoints:</a:t>
-            </a:r>
-            <a:br>
-              <a:rPr lang="en-US" dirty="0"/>
-            </a:br>
-            <a:r>
-              <a:rPr lang="en-US" dirty="0"/>
-              <a:t>(0, 27, -90), (0, 24, 90), (0, 24, 90), (0, 48, -90), (0, 24, -90), (0, 48, 90), (0, 24, 90), (0, 24, -90), (0, 24, 0)</a:t>
-            </a:r>
+              <a:rPr lang="en-US" b="0" dirty="0" err="1">
+                <a:solidFill>
+                  <a:srgbClr val="4EC9B0"/>
+                </a:solidFill>
+                <a:effectLst/>
+                <a:latin typeface="Consolas" panose="020B0609020204030204" pitchFamily="49" charset="0"/>
+              </a:rPr>
+              <a:t>TrcEvent</a:t>
+            </a:r>
+            <a:r>
+              <a:rPr lang="en-US" b="0" dirty="0">
+                <a:solidFill>
+                  <a:srgbClr val="D4D4D4"/>
+                </a:solidFill>
+                <a:effectLst/>
+                <a:latin typeface="Consolas" panose="020B0609020204030204" pitchFamily="49" charset="0"/>
+              </a:rPr>
+              <a:t> </a:t>
+            </a:r>
+            <a:r>
+              <a:rPr lang="en-US" b="0" dirty="0">
+                <a:solidFill>
+                  <a:srgbClr val="9CDCFE"/>
+                </a:solidFill>
+                <a:effectLst/>
+                <a:latin typeface="Consolas" panose="020B0609020204030204" pitchFamily="49" charset="0"/>
+              </a:rPr>
+              <a:t>event</a:t>
+            </a:r>
+            <a:r>
+              <a:rPr lang="en-US" b="0" dirty="0">
+                <a:solidFill>
+                  <a:srgbClr val="D4D4D4"/>
+                </a:solidFill>
+                <a:effectLst/>
+                <a:latin typeface="Consolas" panose="020B0609020204030204" pitchFamily="49" charset="0"/>
+              </a:rPr>
+              <a:t>, </a:t>
+            </a:r>
+            <a:r>
+              <a:rPr lang="en-US" b="0" dirty="0">
+                <a:solidFill>
+                  <a:srgbClr val="4EC9B0"/>
+                </a:solidFill>
+                <a:effectLst/>
+                <a:latin typeface="Consolas" panose="020B0609020204030204" pitchFamily="49" charset="0"/>
+              </a:rPr>
+              <a:t>double</a:t>
+            </a:r>
+            <a:r>
+              <a:rPr lang="en-US" b="0" dirty="0">
+                <a:solidFill>
+                  <a:srgbClr val="D4D4D4"/>
+                </a:solidFill>
+                <a:effectLst/>
+                <a:latin typeface="Consolas" panose="020B0609020204030204" pitchFamily="49" charset="0"/>
+              </a:rPr>
+              <a:t> </a:t>
+            </a:r>
+            <a:r>
+              <a:rPr lang="en-US" b="0" dirty="0">
+                <a:solidFill>
+                  <a:srgbClr val="9CDCFE"/>
+                </a:solidFill>
+                <a:effectLst/>
+                <a:latin typeface="Consolas" panose="020B0609020204030204" pitchFamily="49" charset="0"/>
+              </a:rPr>
+              <a:t>timeout</a:t>
+            </a:r>
+            <a:r>
+              <a:rPr lang="en-US" b="0" dirty="0">
+                <a:solidFill>
+                  <a:srgbClr val="D4D4D4"/>
+                </a:solidFill>
+                <a:effectLst/>
+                <a:latin typeface="Consolas" panose="020B0609020204030204" pitchFamily="49" charset="0"/>
+              </a:rPr>
+              <a:t>)</a:t>
+            </a:r>
+            <a:endParaRPr lang="en-US" dirty="0"/>
           </a:p>
         </p:txBody>
       </p:sp>
     </p:spTree>
     <p:extLst>
       <p:ext uri="{BB962C8B-B14F-4D97-AF65-F5344CB8AC3E}">
-        <p14:creationId xmlns:p14="http://schemas.microsoft.com/office/powerpoint/2010/main" val="2764080848"/>
+        <p14:creationId xmlns:p14="http://schemas.microsoft.com/office/powerpoint/2010/main" val="3699364540"/>
       </p:ext>
     </p:extLst>
   </p:cSld>
@@ -14019,7 +14515,7 @@
           <p:cNvPr id="2" name="Title 1">
             <a:extLst>
               <a:ext uri="{FF2B5EF4-FFF2-40B4-BE49-F238E27FC236}">
-                <a16:creationId xmlns:a16="http://schemas.microsoft.com/office/drawing/2014/main" id="{F3AAD952-8A8E-4CD0-BBD6-77DC66A68A03}"/>
+                <a16:creationId xmlns:a16="http://schemas.microsoft.com/office/drawing/2014/main" id="{09F4C2DE-1E97-4D6C-B924-24333C07B33A}"/>
               </a:ext>
             </a:extLst>
           </p:cNvPr>
@@ -14036,9 +14532,10 @@
           <a:lstStyle/>
           <a:p>
             <a:r>
-              <a:rPr lang="en-US" dirty="0"/>
-              <a:t>Sensor Drive</a:t>
-            </a:r>
+              <a:rPr lang="en-US" dirty="0" err="1"/>
+              <a:t>TrcPath</a:t>
+            </a:r>
+            <a:endParaRPr lang="en-US" dirty="0"/>
           </a:p>
         </p:txBody>
       </p:sp>
@@ -14047,7 +14544,7 @@
           <p:cNvPr id="3" name="Content Placeholder 2">
             <a:extLst>
               <a:ext uri="{FF2B5EF4-FFF2-40B4-BE49-F238E27FC236}">
-                <a16:creationId xmlns:a16="http://schemas.microsoft.com/office/drawing/2014/main" id="{9BDEE310-8036-4EF7-8E7C-F212163193B1}"/>
+                <a16:creationId xmlns:a16="http://schemas.microsoft.com/office/drawing/2014/main" id="{EA1D6505-D893-49E8-8118-580F873467C0}"/>
               </a:ext>
             </a:extLst>
           </p:cNvPr>
@@ -14060,8 +14557,8 @@
         </p:nvSpPr>
         <p:spPr>
           <a:xfrm>
-            <a:off x="528506" y="2273417"/>
-            <a:ext cx="10997967" cy="4584583"/>
+            <a:off x="553673" y="2290195"/>
+            <a:ext cx="11039911" cy="4584583"/>
           </a:xfrm>
         </p:spPr>
         <p:txBody>
@@ -14071,34 +14568,88 @@
           <a:lstStyle/>
           <a:p>
             <a:r>
-              <a:rPr lang="en-US" dirty="0"/>
-              <a:t>A drive base has a number of degrees of freedom. A tank drive base has 2: Y-axis and rotation. A </a:t>
-            </a:r>
-            <a:r>
               <a:rPr lang="en-US" dirty="0" err="1"/>
-              <a:t>mecanum</a:t>
-            </a:r>
-            <a:r>
-              <a:rPr lang="en-US" dirty="0"/>
-              <a:t> or swerve drive base has 3: X-axis, Y-axis and rotation.</a:t>
-            </a:r>
-          </a:p>
-          <a:p>
-            <a:r>
-              <a:rPr lang="en-US" dirty="0"/>
-              <a:t>In order to navigate a drive base, there must be a number of controllers equal to the number of degrees of freedom. TRC Library provided a generic PID controlled drive class (TrcPidDrive.java) that can PID controlled drive up to 3 degrees of freedom. Therefore, it takes up to 3 PID controllers, one for each degree of freedom: X-PID controller, Y-PID controller and Turn-PID controller.</a:t>
-            </a:r>
-          </a:p>
-          <a:p>
-            <a:r>
-              <a:rPr lang="en-US" dirty="0"/>
-              <a:t>Each PID controller must be able to get feedback on the movement along its degree of freedom. Typically, for X and Y axes, we use encoders to tell us how far the robot has moved in the corresponding axes. For rotation, we use gyro to tell us the robot’s heading. These are feedback sensors.</a:t>
-            </a:r>
-          </a:p>
-          <a:p>
-            <a:r>
-              <a:rPr lang="en-US" dirty="0"/>
-              <a:t>One could be creative on using different sensors to achieve different PID controlled drive scenarios. For example, using ultrasonic sensor as the Y-axis feedback sensor allows the robot to drive up to a given distance from an obstacle. Using a pair of distance sensors on the side of the robot as turn feedback sensors allows the robot to follow the wall. Using one or more light sensors pointing to the ground as rotation feedback sensors allows the robot to follow a line on the ground. Camera and vision processing can detect the distance and angle of your target. Using distance info as the Y-axis feedback sensor and angle info as rotation feedback sensor allows the robot to navigate and align to the target.</a:t>
+              <a:t>TrcPath</a:t>
+            </a:r>
+            <a:r>
+              <a:rPr lang="en-US" dirty="0"/>
+              <a:t> defines a path for the robot to follow and whether waypoint headings are in degrees or radians. A path is an array of waypoints.</a:t>
+            </a:r>
+          </a:p>
+          <a:p>
+            <a:r>
+              <a:rPr lang="en-US" dirty="0"/>
+              <a:t>A waypoint defines a point on the path and contains info such as:</a:t>
+            </a:r>
+          </a:p>
+          <a:p>
+            <a:pPr lvl="1"/>
+            <a:r>
+              <a:rPr lang="en-US" dirty="0"/>
+              <a:t>timestep – a timestamp relative to the starting time of the path. This is optional and is only required for a certain motion drive strategies (not needed by Pure Pursuit).</a:t>
+            </a:r>
+          </a:p>
+          <a:p>
+            <a:pPr lvl="1"/>
+            <a:r>
+              <a:rPr lang="en-US" b="1" dirty="0"/>
+              <a:t>pose</a:t>
+            </a:r>
+            <a:r>
+              <a:rPr lang="en-US" dirty="0"/>
+              <a:t> – location of the waypoint: X, Y and heading. This is always required for any motion drive strategies.</a:t>
+            </a:r>
+          </a:p>
+          <a:p>
+            <a:pPr lvl="1"/>
+            <a:r>
+              <a:rPr lang="en-US" dirty="0" err="1"/>
+              <a:t>encoderPosition</a:t>
+            </a:r>
+            <a:r>
+              <a:rPr lang="en-US" dirty="0"/>
+              <a:t> – specifies the encoder position at this waypoint (not needed by Pure Pursuit).</a:t>
+            </a:r>
+          </a:p>
+          <a:p>
+            <a:pPr lvl="1"/>
+            <a:r>
+              <a:rPr lang="en-US" dirty="0"/>
+              <a:t>velocity – specifies the tangential velocity of the robot at this waypoint (not needed by Pure Pursuit).</a:t>
+            </a:r>
+          </a:p>
+          <a:p>
+            <a:pPr lvl="1"/>
+            <a:r>
+              <a:rPr lang="en-US" dirty="0"/>
+              <a:t>acceleration – specifies the tangential acceleration of the robot at this waypoint (not needed by Pure Pursuit).</a:t>
+            </a:r>
+          </a:p>
+          <a:p>
+            <a:pPr lvl="1"/>
+            <a:r>
+              <a:rPr lang="en-US" dirty="0"/>
+              <a:t>jerk – specifies the jerk (derivative of acceleration) of the robot at this waypoint (not needed by Pure Pursuit).</a:t>
+            </a:r>
+          </a:p>
+          <a:p>
+            <a:r>
+              <a:rPr lang="en-US" dirty="0"/>
+              <a:t>There are two types of path:</a:t>
+            </a:r>
+          </a:p>
+          <a:p>
+            <a:pPr lvl="1"/>
+            <a:r>
+              <a:rPr lang="en-US" dirty="0"/>
+              <a:t>Absolute path: the location of each waypoint is an absolute position in a reference frame (usually the competition field).</a:t>
+            </a:r>
+          </a:p>
+          <a:p>
+            <a:pPr lvl="1"/>
+            <a:r>
+              <a:rPr lang="en-US" dirty="0"/>
+              <a:t>Incremental path: the location of each waypoint is a relative position from the previous waypoint on the path.</a:t>
             </a:r>
           </a:p>
         </p:txBody>
@@ -14106,7 +14657,7 @@
     </p:spTree>
     <p:extLst>
       <p:ext uri="{BB962C8B-B14F-4D97-AF65-F5344CB8AC3E}">
-        <p14:creationId xmlns:p14="http://schemas.microsoft.com/office/powerpoint/2010/main" val="3458598938"/>
+        <p14:creationId xmlns:p14="http://schemas.microsoft.com/office/powerpoint/2010/main" val="2656173237"/>
       </p:ext>
     </p:extLst>
   </p:cSld>
@@ -14138,7 +14689,7 @@
           <p:cNvPr id="2" name="Title 1">
             <a:extLst>
               <a:ext uri="{FF2B5EF4-FFF2-40B4-BE49-F238E27FC236}">
-                <a16:creationId xmlns:a16="http://schemas.microsoft.com/office/drawing/2014/main" id="{F3AAD952-8A8E-4CD0-BBD6-77DC66A68A03}"/>
+                <a16:creationId xmlns:a16="http://schemas.microsoft.com/office/drawing/2014/main" id="{09F4C2DE-1E97-4D6C-B924-24333C07B33A}"/>
               </a:ext>
             </a:extLst>
           </p:cNvPr>
@@ -14155,9 +14706,10 @@
           <a:lstStyle/>
           <a:p>
             <a:r>
-              <a:rPr lang="en-US" dirty="0"/>
-              <a:t>PID Control Drive Using Sensors</a:t>
-            </a:r>
+              <a:rPr lang="en-US" dirty="0" err="1"/>
+              <a:t>TrcPathBuilder</a:t>
+            </a:r>
+            <a:endParaRPr lang="en-US" dirty="0"/>
           </a:p>
         </p:txBody>
       </p:sp>
@@ -14166,7 +14718,7 @@
           <p:cNvPr id="3" name="Content Placeholder 2">
             <a:extLst>
               <a:ext uri="{FF2B5EF4-FFF2-40B4-BE49-F238E27FC236}">
-                <a16:creationId xmlns:a16="http://schemas.microsoft.com/office/drawing/2014/main" id="{9BDEE310-8036-4EF7-8E7C-F212163193B1}"/>
+                <a16:creationId xmlns:a16="http://schemas.microsoft.com/office/drawing/2014/main" id="{EA1D6505-D893-49E8-8118-580F873467C0}"/>
               </a:ext>
             </a:extLst>
           </p:cNvPr>
@@ -14179,72 +14731,261 @@
         </p:nvSpPr>
         <p:spPr>
           <a:xfrm>
-            <a:off x="528506" y="2273417"/>
-            <a:ext cx="10997967" cy="4584583"/>
+            <a:off x="553673" y="2290195"/>
+            <a:ext cx="11039911" cy="4584583"/>
           </a:xfrm>
         </p:spPr>
         <p:txBody>
           <a:bodyPr>
-            <a:normAutofit/>
+            <a:normAutofit fontScale="92500" lnSpcReduction="10000"/>
           </a:bodyPr>
           <a:lstStyle/>
           <a:p>
             <a:r>
               <a:rPr lang="en-US" dirty="0" err="1"/>
-              <a:t>TrcPidDrive</a:t>
-            </a:r>
-            <a:r>
-              <a:rPr lang="en-US" dirty="0"/>
-              <a:t> provides different drive options:</a:t>
-            </a:r>
+              <a:t>TrcPathBuilder</a:t>
+            </a:r>
+            <a:r>
+              <a:rPr lang="en-US" dirty="0"/>
+              <a:t> is a utility class that makes it easier to build paths for Pure Pursuit Drive.</a:t>
+            </a:r>
+          </a:p>
+          <a:p>
+            <a:r>
+              <a:rPr lang="en-US" dirty="0"/>
+              <a:t>Pure Pursuit Drive requires all waypoints relative to the first waypoint in the path.</a:t>
+            </a:r>
+          </a:p>
+          <a:p>
+            <a:r>
+              <a:rPr lang="en-US" dirty="0" err="1"/>
+              <a:t>TrcPathBuilder</a:t>
+            </a:r>
+            <a:r>
+              <a:rPr lang="en-US" dirty="0"/>
+              <a:t> can build such a path for Pure Pursuit from a field absolute path or an incremental path.</a:t>
+            </a:r>
+          </a:p>
+          <a:p>
+            <a:r>
+              <a:rPr lang="en-US" dirty="0" err="1"/>
+              <a:t>TrcPathBuilder</a:t>
+            </a:r>
+            <a:r>
+              <a:rPr lang="en-US" dirty="0"/>
+              <a:t> Constructor:</a:t>
+            </a:r>
+            <a:br>
+              <a:rPr lang="en-US" dirty="0"/>
+            </a:br>
+            <a:r>
+              <a:rPr lang="en-US" b="0" dirty="0" err="1">
+                <a:solidFill>
+                  <a:srgbClr val="DCDCAA"/>
+                </a:solidFill>
+                <a:effectLst/>
+                <a:latin typeface="Consolas" panose="020B0609020204030204" pitchFamily="49" charset="0"/>
+              </a:rPr>
+              <a:t>TrcPathBuilder</a:t>
+            </a:r>
+            <a:r>
+              <a:rPr lang="en-US" b="0" dirty="0">
+                <a:solidFill>
+                  <a:srgbClr val="D4D4D4"/>
+                </a:solidFill>
+                <a:effectLst/>
+                <a:latin typeface="Consolas" panose="020B0609020204030204" pitchFamily="49" charset="0"/>
+              </a:rPr>
+              <a:t>(</a:t>
+            </a:r>
+            <a:r>
+              <a:rPr lang="en-US" b="0" dirty="0">
+                <a:solidFill>
+                  <a:srgbClr val="4EC9B0"/>
+                </a:solidFill>
+                <a:effectLst/>
+                <a:latin typeface="Consolas" panose="020B0609020204030204" pitchFamily="49" charset="0"/>
+              </a:rPr>
+              <a:t>TrcPose2D</a:t>
+            </a:r>
+            <a:r>
+              <a:rPr lang="en-US" b="0" dirty="0">
+                <a:solidFill>
+                  <a:srgbClr val="D4D4D4"/>
+                </a:solidFill>
+                <a:effectLst/>
+                <a:latin typeface="Consolas" panose="020B0609020204030204" pitchFamily="49" charset="0"/>
+              </a:rPr>
+              <a:t> </a:t>
+            </a:r>
+            <a:r>
+              <a:rPr lang="en-US" b="0" dirty="0" err="1">
+                <a:solidFill>
+                  <a:srgbClr val="9CDCFE"/>
+                </a:solidFill>
+                <a:effectLst/>
+                <a:latin typeface="Consolas" panose="020B0609020204030204" pitchFamily="49" charset="0"/>
+              </a:rPr>
+              <a:t>startingPose</a:t>
+            </a:r>
+            <a:r>
+              <a:rPr lang="en-US" b="0" dirty="0">
+                <a:solidFill>
+                  <a:srgbClr val="D4D4D4"/>
+                </a:solidFill>
+                <a:effectLst/>
+                <a:latin typeface="Consolas" panose="020B0609020204030204" pitchFamily="49" charset="0"/>
+              </a:rPr>
+              <a:t>, </a:t>
+            </a:r>
+            <a:r>
+              <a:rPr lang="en-US" b="0" dirty="0" err="1">
+                <a:solidFill>
+                  <a:srgbClr val="4EC9B0"/>
+                </a:solidFill>
+                <a:effectLst/>
+                <a:latin typeface="Consolas" panose="020B0609020204030204" pitchFamily="49" charset="0"/>
+              </a:rPr>
+              <a:t>boolean</a:t>
+            </a:r>
+            <a:r>
+              <a:rPr lang="en-US" b="0" dirty="0">
+                <a:solidFill>
+                  <a:srgbClr val="D4D4D4"/>
+                </a:solidFill>
+                <a:effectLst/>
+                <a:latin typeface="Consolas" panose="020B0609020204030204" pitchFamily="49" charset="0"/>
+              </a:rPr>
+              <a:t> </a:t>
+            </a:r>
+            <a:r>
+              <a:rPr lang="en-US" b="0" dirty="0" err="1">
+                <a:solidFill>
+                  <a:srgbClr val="9CDCFE"/>
+                </a:solidFill>
+                <a:effectLst/>
+                <a:latin typeface="Consolas" panose="020B0609020204030204" pitchFamily="49" charset="0"/>
+              </a:rPr>
+              <a:t>incrementalPath</a:t>
+            </a:r>
+            <a:r>
+              <a:rPr lang="en-US" b="0" dirty="0">
+                <a:solidFill>
+                  <a:srgbClr val="D4D4D4"/>
+                </a:solidFill>
+                <a:effectLst/>
+                <a:latin typeface="Consolas" panose="020B0609020204030204" pitchFamily="49" charset="0"/>
+              </a:rPr>
+              <a:t>, </a:t>
+            </a:r>
+            <a:r>
+              <a:rPr lang="en-US" b="0" dirty="0" err="1">
+                <a:solidFill>
+                  <a:srgbClr val="4EC9B0"/>
+                </a:solidFill>
+                <a:effectLst/>
+                <a:latin typeface="Consolas" panose="020B0609020204030204" pitchFamily="49" charset="0"/>
+              </a:rPr>
+              <a:t>boolean</a:t>
+            </a:r>
+            <a:r>
+              <a:rPr lang="en-US" b="0" dirty="0">
+                <a:solidFill>
+                  <a:srgbClr val="D4D4D4"/>
+                </a:solidFill>
+                <a:effectLst/>
+                <a:latin typeface="Consolas" panose="020B0609020204030204" pitchFamily="49" charset="0"/>
+              </a:rPr>
+              <a:t> </a:t>
+            </a:r>
+            <a:r>
+              <a:rPr lang="en-US" b="0" dirty="0" err="1">
+                <a:solidFill>
+                  <a:srgbClr val="9CDCFE"/>
+                </a:solidFill>
+                <a:effectLst/>
+                <a:latin typeface="Consolas" panose="020B0609020204030204" pitchFamily="49" charset="0"/>
+              </a:rPr>
+              <a:t>inDegrees</a:t>
+            </a:r>
+            <a:r>
+              <a:rPr lang="en-US" b="0" dirty="0">
+                <a:solidFill>
+                  <a:srgbClr val="D4D4D4"/>
+                </a:solidFill>
+                <a:effectLst/>
+                <a:latin typeface="Consolas" panose="020B0609020204030204" pitchFamily="49" charset="0"/>
+              </a:rPr>
+              <a:t>)</a:t>
+            </a:r>
+            <a:endParaRPr lang="en-US" dirty="0"/>
           </a:p>
           <a:p>
             <a:pPr lvl="1"/>
             <a:r>
               <a:rPr lang="en-US" dirty="0" err="1"/>
-              <a:t>setRelativeTarget</a:t>
-            </a:r>
-            <a:r>
-              <a:rPr lang="en-US" dirty="0"/>
-              <a:t> – Typically uses encoders as X/Y feedback sensors and gyro as heading sensor. Targets are set as relative distance from current position.</a:t>
+              <a:t>startingPose</a:t>
+            </a:r>
+            <a:r>
+              <a:rPr lang="en-US" dirty="0"/>
+              <a:t> – absolution position of the robot at the start of the path (i.e. absolute field position of the robot).</a:t>
             </a:r>
           </a:p>
           <a:p>
             <a:pPr lvl="1"/>
             <a:r>
               <a:rPr lang="en-US" dirty="0" err="1"/>
-              <a:t>setAbsoluteTarget</a:t>
-            </a:r>
-            <a:r>
-              <a:rPr lang="en-US" dirty="0"/>
-              <a:t> – Typically uses encoders as X/Y feedback sensors and gyro as heading sensor. Targets are absolute field position.</a:t>
+              <a:t>incrementalPath</a:t>
+            </a:r>
+            <a:r>
+              <a:rPr lang="en-US" dirty="0"/>
+              <a:t> – specifies whether the path is given as incremental path or absolute path.</a:t>
             </a:r>
           </a:p>
           <a:p>
             <a:pPr lvl="1"/>
             <a:r>
               <a:rPr lang="en-US" dirty="0" err="1"/>
-              <a:t>setSensorTarget</a:t>
-            </a:r>
-            <a:r>
-              <a:rPr lang="en-US" dirty="0"/>
-              <a:t> – All three degrees of freedom can use any type of sensors. The target values are generally absolute sensor values. For example, using ultrasonic sensor to drive the robot to N inches in front of an obstacle, the Y target will be set as absolute N inches. Using light sensor to follow a line on the floor will set the turn target value as the absolute light value average between the white line and the dark floor. Sometimes it is useful for a PID controller to use multiple sensors to control a degree of freedom. For example, using a pair of distance sensors to control the turn target can be used to follow the wall. Just set the absolute turn target to zero and report the heading to the PID controller by subtracting the back distance sensor from the front distance sensor. Note that </a:t>
-            </a:r>
+              <a:t>inDegrees</a:t>
+            </a:r>
+            <a:r>
+              <a:rPr lang="en-US" dirty="0"/>
+              <a:t> – specifies whether the waypoint headings are in degrees or radians.</a:t>
+            </a:r>
+          </a:p>
+          <a:p>
+            <a:r>
+              <a:rPr lang="en-US" dirty="0"/>
+              <a:t>Methods:</a:t>
+            </a:r>
+          </a:p>
+          <a:p>
+            <a:pPr lvl="1"/>
+            <a:r>
+              <a:rPr lang="en-US" dirty="0"/>
+              <a:t>append – append a point to the path (the point can be a waypoint or a pose).</a:t>
+            </a:r>
+          </a:p>
+          <a:p>
+            <a:pPr lvl="1"/>
             <a:r>
               <a:rPr lang="en-US" dirty="0" err="1"/>
-              <a:t>AbsoluteTargetMode</a:t>
-            </a:r>
-            <a:r>
-              <a:rPr lang="en-US" dirty="0"/>
-              <a:t> cannot be used in </a:t>
-            </a:r>
+              <a:t>toPath</a:t>
+            </a:r>
+            <a:r>
+              <a:rPr lang="en-US" dirty="0"/>
+              <a:t> – returns a path that contains absolute waypoints in the reference frame.</a:t>
+            </a:r>
+          </a:p>
+          <a:p>
+            <a:pPr lvl="1"/>
             <a:r>
               <a:rPr lang="en-US" dirty="0" err="1"/>
-              <a:t>setSensorTarget</a:t>
-            </a:r>
-            <a:r>
-              <a:rPr lang="en-US" dirty="0"/>
-              <a:t>.</a:t>
+              <a:t>toRelativeStartPath</a:t>
+            </a:r>
+            <a:r>
+              <a:rPr lang="en-US" dirty="0"/>
+              <a:t> – returns a path that contains waypoints relative to the first waypoint of the path (this is the type of path Pure Pursuit needs).</a:t>
             </a:r>
           </a:p>
         </p:txBody>
@@ -14252,7 +14993,7 @@
     </p:spTree>
     <p:extLst>
       <p:ext uri="{BB962C8B-B14F-4D97-AF65-F5344CB8AC3E}">
-        <p14:creationId xmlns:p14="http://schemas.microsoft.com/office/powerpoint/2010/main" val="3993184680"/>
+        <p14:creationId xmlns:p14="http://schemas.microsoft.com/office/powerpoint/2010/main" val="3392496885"/>
       </p:ext>
     </p:extLst>
   </p:cSld>
@@ -14284,7 +15025,7 @@
           <p:cNvPr id="2" name="Title 1">
             <a:extLst>
               <a:ext uri="{FF2B5EF4-FFF2-40B4-BE49-F238E27FC236}">
-                <a16:creationId xmlns:a16="http://schemas.microsoft.com/office/drawing/2014/main" id="{F3AAD952-8A8E-4CD0-BBD6-77DC66A68A03}"/>
+                <a16:creationId xmlns:a16="http://schemas.microsoft.com/office/drawing/2014/main" id="{7EF6B6A5-823D-42D9-A995-64CE913A925F}"/>
               </a:ext>
             </a:extLst>
           </p:cNvPr>
@@ -14297,8 +15038,8 @@
         </p:nvSpPr>
         <p:spPr>
           <a:xfrm>
-            <a:off x="528506" y="973668"/>
-            <a:ext cx="10620463" cy="706964"/>
+            <a:off x="503339" y="973668"/>
+            <a:ext cx="10410737" cy="706964"/>
           </a:xfrm>
         </p:spPr>
         <p:txBody>
@@ -14307,7 +15048,7 @@
           <a:p>
             <a:r>
               <a:rPr lang="en-US" dirty="0"/>
-              <a:t>Exercise: Wall Following Drive</a:t>
+              <a:t>Exercise: Drive Robot Through a Slalom Path</a:t>
             </a:r>
           </a:p>
         </p:txBody>
@@ -14317,7 +15058,7 @@
           <p:cNvPr id="3" name="Content Placeholder 2">
             <a:extLst>
               <a:ext uri="{FF2B5EF4-FFF2-40B4-BE49-F238E27FC236}">
-                <a16:creationId xmlns:a16="http://schemas.microsoft.com/office/drawing/2014/main" id="{9BDEE310-8036-4EF7-8E7C-F212163193B1}"/>
+                <a16:creationId xmlns:a16="http://schemas.microsoft.com/office/drawing/2014/main" id="{097A9A0A-0F06-4864-AD5C-3C7501CDEDFD}"/>
               </a:ext>
             </a:extLst>
           </p:cNvPr>
@@ -14330,41 +15071,26 @@
         </p:nvSpPr>
         <p:spPr>
           <a:xfrm>
-            <a:off x="528506" y="2273417"/>
-            <a:ext cx="10997967" cy="4584583"/>
+            <a:off x="503340" y="2265028"/>
+            <a:ext cx="11115412" cy="4410092"/>
           </a:xfrm>
         </p:spPr>
         <p:txBody>
           <a:bodyPr>
-            <a:normAutofit lnSpcReduction="10000"/>
+            <a:normAutofit/>
           </a:bodyPr>
           <a:lstStyle/>
           <a:p>
             <a:r>
               <a:rPr lang="en-US" dirty="0"/>
-              <a:t>Strafe the robot to the side wall until it is 12 inches away from it. Use two distance sensors to drive the robot following the wall for 10 feet.</a:t>
+              <a:t>Navigate the robot through a slalom path using Pure Pursuit Drive.</a:t>
             </a:r>
           </a:p>
           <a:p>
             <a:pPr lvl="1"/>
             <a:r>
               <a:rPr lang="en-US" dirty="0"/>
-              <a:t>Create two distance sensor objects such as the </a:t>
-            </a:r>
-            <a:r>
-              <a:rPr lang="en-US" dirty="0" err="1"/>
-              <a:t>FrcLaserShark</a:t>
-            </a:r>
-            <a:r>
-              <a:rPr lang="en-US" dirty="0"/>
-              <a:t>.</a:t>
-            </a:r>
-          </a:p>
-          <a:p>
-            <a:pPr lvl="1"/>
-            <a:r>
-              <a:rPr lang="en-US" dirty="0"/>
-              <a:t>Create a </a:t>
+              <a:t>In previous exercises, you have already created a </a:t>
             </a:r>
             <a:r>
               <a:rPr lang="en-US" dirty="0" err="1"/>
@@ -14379,70 +15105,155 @@
             <a:pPr lvl="1"/>
             <a:r>
               <a:rPr lang="en-US" dirty="0"/>
-              <a:t>Create three PID controllers:</a:t>
-            </a:r>
-          </a:p>
-          <a:p>
-            <a:pPr lvl="2"/>
-            <a:r>
-              <a:rPr lang="en-US" dirty="0"/>
-              <a:t>X PID controller averages the two distance sensors to control the X distance from the wall.</a:t>
-            </a:r>
-          </a:p>
-          <a:p>
-            <a:pPr lvl="2"/>
-            <a:r>
-              <a:rPr lang="en-US" dirty="0"/>
-              <a:t>Y PID controller uses the drive base encoders to control the Y distance to travel.</a:t>
-            </a:r>
-          </a:p>
-          <a:p>
-            <a:pPr lvl="2"/>
-            <a:r>
-              <a:rPr lang="en-US" dirty="0"/>
-              <a:t>Turn PID controller uses the difference of the distance sensors to control the heading of the robot.</a:t>
+              <a:t>In Robot.java, add code to the </a:t>
+            </a:r>
+            <a:r>
+              <a:rPr lang="en-US" dirty="0" err="1"/>
+              <a:t>robotInit</a:t>
+            </a:r>
+            <a:r>
+              <a:rPr lang="en-US" dirty="0"/>
+              <a:t> method to create the </a:t>
+            </a:r>
+            <a:r>
+              <a:rPr lang="en-US" dirty="0" err="1"/>
+              <a:t>purePursuitDrive</a:t>
+            </a:r>
+            <a:r>
+              <a:rPr lang="en-US" dirty="0"/>
+              <a:t> (</a:t>
+            </a:r>
+            <a:r>
+              <a:rPr lang="en-US" dirty="0" err="1"/>
+              <a:t>TrcPurePursuitDrive</a:t>
+            </a:r>
+            <a:r>
+              <a:rPr lang="en-US" dirty="0"/>
+              <a:t>), specifying a name, the </a:t>
+            </a:r>
+            <a:r>
+              <a:rPr lang="en-US" dirty="0" err="1"/>
+              <a:t>mecanum</a:t>
+            </a:r>
+            <a:r>
+              <a:rPr lang="en-US" dirty="0"/>
+              <a:t> drive base, </a:t>
+            </a:r>
+            <a:r>
+              <a:rPr lang="en-US" dirty="0" err="1"/>
+              <a:t>proximityRadius</a:t>
+            </a:r>
+            <a:r>
+              <a:rPr lang="en-US" dirty="0"/>
+              <a:t> set to 12.0, </a:t>
+            </a:r>
+            <a:r>
+              <a:rPr lang="en-US" dirty="0" err="1"/>
+              <a:t>posTolerance</a:t>
+            </a:r>
+            <a:r>
+              <a:rPr lang="en-US" dirty="0"/>
+              <a:t> set to 2.0, </a:t>
+            </a:r>
+            <a:r>
+              <a:rPr lang="en-US" dirty="0" err="1"/>
+              <a:t>turnTolerance</a:t>
+            </a:r>
+            <a:r>
+              <a:rPr lang="en-US" dirty="0"/>
+              <a:t> set to 2.0 and the PID coefficients for the four PID controllers (</a:t>
+            </a:r>
+            <a:r>
+              <a:rPr lang="en-US" dirty="0" err="1"/>
+              <a:t>XPos</a:t>
+            </a:r>
+            <a:r>
+              <a:rPr lang="en-US" dirty="0"/>
+              <a:t>, </a:t>
+            </a:r>
+            <a:r>
+              <a:rPr lang="en-US" dirty="0" err="1"/>
+              <a:t>YPos</a:t>
+            </a:r>
+            <a:r>
+              <a:rPr lang="en-US" dirty="0"/>
+              <a:t>, Rotation and Velocity).</a:t>
             </a:r>
           </a:p>
           <a:p>
             <a:pPr lvl="1"/>
             <a:r>
               <a:rPr lang="en-US" dirty="0"/>
-              <a:t>Create a PID drive using the three PID controllers.</a:t>
+              <a:t>Enable fast mode by calling </a:t>
+            </a:r>
+            <a:r>
+              <a:rPr lang="en-US" dirty="0" err="1"/>
+              <a:t>purePursuitDrive.setFastModeEnabled</a:t>
+            </a:r>
+            <a:r>
+              <a:rPr lang="en-US" dirty="0"/>
+              <a:t>(true).</a:t>
             </a:r>
           </a:p>
           <a:p>
             <a:pPr lvl="1"/>
             <a:r>
               <a:rPr lang="en-US" dirty="0"/>
-              <a:t>Create an autonomous command module which implements a state machine to:</a:t>
-            </a:r>
-          </a:p>
-          <a:p>
-            <a:pPr lvl="2"/>
-            <a:r>
-              <a:rPr lang="en-US" dirty="0"/>
-              <a:t>Strafe sideways until the robot is 12 inches away from the wall.</a:t>
-            </a:r>
-          </a:p>
-          <a:p>
-            <a:pPr lvl="2"/>
-            <a:r>
-              <a:rPr lang="en-US" dirty="0"/>
-              <a:t>Go forward 10 feet and maintaining the distance of 12 inches from the wall.</a:t>
-            </a:r>
-          </a:p>
-          <a:p>
-            <a:pPr lvl="2"/>
-            <a:r>
-              <a:rPr lang="en-US" dirty="0"/>
-              <a:t>Stop.</a:t>
+              <a:t>In </a:t>
+            </a:r>
+            <a:r>
+              <a:rPr lang="en-US" dirty="0" err="1"/>
+              <a:t>FrcTeleOp</a:t>
+            </a:r>
+            <a:r>
+              <a:rPr lang="en-US" dirty="0"/>
+              <a:t>, add code to the </a:t>
+            </a:r>
+            <a:r>
+              <a:rPr lang="en-US" dirty="0" err="1"/>
+              <a:t>startMode</a:t>
+            </a:r>
+            <a:r>
+              <a:rPr lang="en-US" dirty="0"/>
+              <a:t> method to set the initial robot position to the field position of (x=72.0, y=9.0, angle=0.0). (Hint: </a:t>
+            </a:r>
+            <a:r>
+              <a:rPr lang="en-US" dirty="0" err="1"/>
+              <a:t>driveBase.setFieldPosition</a:t>
+            </a:r>
+            <a:r>
+              <a:rPr lang="en-US" dirty="0"/>
+              <a:t>).</a:t>
             </a:r>
           </a:p>
           <a:p>
             <a:pPr lvl="1"/>
             <a:r>
               <a:rPr lang="en-US" dirty="0"/>
-              <a:t>Add the autonomous command module as one of the autonomous choices.</a:t>
+              <a:t>Add code to </a:t>
+            </a:r>
+            <a:r>
+              <a:rPr lang="en-US" dirty="0" err="1"/>
+              <a:t>driverControllerButtonEvent</a:t>
+            </a:r>
+            <a:r>
+              <a:rPr lang="en-US" dirty="0"/>
+              <a:t> method to perform the pure pursuit drive (</a:t>
+            </a:r>
+            <a:r>
+              <a:rPr lang="en-US" dirty="0" err="1"/>
+              <a:t>purePursuitDrive.start</a:t>
+            </a:r>
+            <a:r>
+              <a:rPr lang="en-US" dirty="0"/>
+              <a:t>) when button A is pressed and print a message on the dashboard to report the button event. The slalom path has 9 relative waypoints:</a:t>
+            </a:r>
+            <a:br>
+              <a:rPr lang="en-US" dirty="0"/>
+            </a:br>
+            <a:r>
+              <a:rPr lang="en-US" dirty="0"/>
+              <a:t>(0, 27, -90), (0, 24, 90), (0, 24, 90), (0, 48, -90), (0, 24, -90), (0, 48, 90), (0, 24, 90), (0, 24, -90), (0, 24, 0)</a:t>
             </a:r>
           </a:p>
         </p:txBody>
@@ -14450,7 +15261,161 @@
     </p:spTree>
     <p:extLst>
       <p:ext uri="{BB962C8B-B14F-4D97-AF65-F5344CB8AC3E}">
-        <p14:creationId xmlns:p14="http://schemas.microsoft.com/office/powerpoint/2010/main" val="1853354338"/>
+        <p14:creationId xmlns:p14="http://schemas.microsoft.com/office/powerpoint/2010/main" val="2764080848"/>
+      </p:ext>
+    </p:extLst>
+  </p:cSld>
+  <p:clrMapOvr>
+    <a:masterClrMapping/>
+  </p:clrMapOvr>
+</p:sld>
+</file>
+
+<file path=ppt/slides/slide14.xml><?xml version="1.0" encoding="utf-8"?>
+<p:sld xmlns:a="http://schemas.openxmlformats.org/drawingml/2006/main" xmlns:r="http://schemas.openxmlformats.org/officeDocument/2006/relationships" xmlns:p="http://schemas.openxmlformats.org/presentationml/2006/main">
+  <p:cSld>
+    <p:spTree>
+      <p:nvGrpSpPr>
+        <p:cNvPr id="1" name=""/>
+        <p:cNvGrpSpPr/>
+        <p:nvPr/>
+      </p:nvGrpSpPr>
+      <p:grpSpPr>
+        <a:xfrm>
+          <a:off x="0" y="0"/>
+          <a:ext cx="0" cy="0"/>
+          <a:chOff x="0" y="0"/>
+          <a:chExt cx="0" cy="0"/>
+        </a:xfrm>
+      </p:grpSpPr>
+      <p:sp>
+        <p:nvSpPr>
+          <p:cNvPr id="2" name="Title 1">
+            <a:extLst>
+              <a:ext uri="{FF2B5EF4-FFF2-40B4-BE49-F238E27FC236}">
+                <a16:creationId xmlns:a16="http://schemas.microsoft.com/office/drawing/2014/main" id="{CB5C46D4-E6C6-FE43-BBE2-90F86D454524}"/>
+              </a:ext>
+            </a:extLst>
+          </p:cNvPr>
+          <p:cNvSpPr>
+            <a:spLocks noGrp="1"/>
+          </p:cNvSpPr>
+          <p:nvPr>
+            <p:ph type="title"/>
+          </p:nvPr>
+        </p:nvSpPr>
+        <p:spPr/>
+        <p:txBody>
+          <a:bodyPr/>
+          <a:lstStyle/>
+          <a:p>
+            <a:r>
+              <a:rPr lang="en-US" dirty="0"/>
+              <a:t>Slalom Path</a:t>
+            </a:r>
+          </a:p>
+        </p:txBody>
+      </p:sp>
+      <p:sp>
+        <p:nvSpPr>
+          <p:cNvPr id="3" name="Content Placeholder 2">
+            <a:extLst>
+              <a:ext uri="{FF2B5EF4-FFF2-40B4-BE49-F238E27FC236}">
+                <a16:creationId xmlns:a16="http://schemas.microsoft.com/office/drawing/2014/main" id="{36F42924-3039-F922-1AE9-945C54EB6FE7}"/>
+              </a:ext>
+            </a:extLst>
+          </p:cNvPr>
+          <p:cNvSpPr>
+            <a:spLocks noGrp="1"/>
+          </p:cNvSpPr>
+          <p:nvPr>
+            <p:ph idx="1"/>
+          </p:nvPr>
+        </p:nvSpPr>
+        <p:spPr>
+          <a:xfrm>
+            <a:off x="630018" y="2301313"/>
+            <a:ext cx="10946550" cy="4458247"/>
+          </a:xfrm>
+        </p:spPr>
+        <p:txBody>
+          <a:bodyPr/>
+          <a:lstStyle/>
+          <a:p>
+            <a:pPr marL="0" indent="0">
+              <a:buNone/>
+            </a:pPr>
+            <a:r>
+              <a:rPr lang="en-US" dirty="0"/>
+              <a:t>		PID Drive Path									Pure Pursuit Drive Path</a:t>
+            </a:r>
+          </a:p>
+        </p:txBody>
+      </p:sp>
+      <p:pic>
+        <p:nvPicPr>
+          <p:cNvPr id="5" name="Picture 4">
+            <a:extLst>
+              <a:ext uri="{FF2B5EF4-FFF2-40B4-BE49-F238E27FC236}">
+                <a16:creationId xmlns:a16="http://schemas.microsoft.com/office/drawing/2014/main" id="{F65CE39A-30D1-48D9-E35E-A2C5A41B679C}"/>
+              </a:ext>
+            </a:extLst>
+          </p:cNvPr>
+          <p:cNvPicPr>
+            <a:picLocks noChangeAspect="1"/>
+          </p:cNvPicPr>
+          <p:nvPr/>
+        </p:nvPicPr>
+        <p:blipFill>
+          <a:blip r:embed="rId2"/>
+          <a:stretch>
+            <a:fillRect/>
+          </a:stretch>
+        </p:blipFill>
+        <p:spPr>
+          <a:xfrm>
+            <a:off x="615432" y="2853950"/>
+            <a:ext cx="3768692" cy="3752482"/>
+          </a:xfrm>
+          <a:prstGeom prst="rect">
+            <a:avLst/>
+          </a:prstGeom>
+        </p:spPr>
+      </p:pic>
+      <p:pic>
+        <p:nvPicPr>
+          <p:cNvPr id="7" name="Picture 6">
+            <a:extLst>
+              <a:ext uri="{FF2B5EF4-FFF2-40B4-BE49-F238E27FC236}">
+                <a16:creationId xmlns:a16="http://schemas.microsoft.com/office/drawing/2014/main" id="{C91B2BD5-DFA0-C2D7-796E-F8F347A33136}"/>
+              </a:ext>
+            </a:extLst>
+          </p:cNvPr>
+          <p:cNvPicPr>
+            <a:picLocks noChangeAspect="1"/>
+          </p:cNvPicPr>
+          <p:nvPr/>
+        </p:nvPicPr>
+        <p:blipFill>
+          <a:blip r:embed="rId3"/>
+          <a:stretch>
+            <a:fillRect/>
+          </a:stretch>
+        </p:blipFill>
+        <p:spPr>
+          <a:xfrm>
+            <a:off x="6450641" y="2813929"/>
+            <a:ext cx="3813390" cy="3792503"/>
+          </a:xfrm>
+          <a:prstGeom prst="rect">
+            <a:avLst/>
+          </a:prstGeom>
+        </p:spPr>
+      </p:pic>
+    </p:spTree>
+    <p:extLst>
+      <p:ext uri="{BB962C8B-B14F-4D97-AF65-F5344CB8AC3E}">
+        <p14:creationId xmlns:p14="http://schemas.microsoft.com/office/powerpoint/2010/main" val="428977215"/>
       </p:ext>
     </p:extLst>
   </p:cSld>
@@ -15302,6 +16267,464 @@
           <p:cNvPr id="2" name="Title 1">
             <a:extLst>
               <a:ext uri="{FF2B5EF4-FFF2-40B4-BE49-F238E27FC236}">
+                <a16:creationId xmlns:a16="http://schemas.microsoft.com/office/drawing/2014/main" id="{F3AAD952-8A8E-4CD0-BBD6-77DC66A68A03}"/>
+              </a:ext>
+            </a:extLst>
+          </p:cNvPr>
+          <p:cNvSpPr>
+            <a:spLocks noGrp="1"/>
+          </p:cNvSpPr>
+          <p:nvPr>
+            <p:ph type="title"/>
+          </p:nvPr>
+        </p:nvSpPr>
+        <p:spPr/>
+        <p:txBody>
+          <a:bodyPr/>
+          <a:lstStyle/>
+          <a:p>
+            <a:r>
+              <a:rPr lang="en-US" dirty="0"/>
+              <a:t>Sensor Drive</a:t>
+            </a:r>
+          </a:p>
+        </p:txBody>
+      </p:sp>
+      <p:sp>
+        <p:nvSpPr>
+          <p:cNvPr id="3" name="Content Placeholder 2">
+            <a:extLst>
+              <a:ext uri="{FF2B5EF4-FFF2-40B4-BE49-F238E27FC236}">
+                <a16:creationId xmlns:a16="http://schemas.microsoft.com/office/drawing/2014/main" id="{9BDEE310-8036-4EF7-8E7C-F212163193B1}"/>
+              </a:ext>
+            </a:extLst>
+          </p:cNvPr>
+          <p:cNvSpPr>
+            <a:spLocks noGrp="1"/>
+          </p:cNvSpPr>
+          <p:nvPr>
+            <p:ph idx="1"/>
+          </p:nvPr>
+        </p:nvSpPr>
+        <p:spPr>
+          <a:xfrm>
+            <a:off x="528506" y="2273417"/>
+            <a:ext cx="10997967" cy="4584583"/>
+          </a:xfrm>
+        </p:spPr>
+        <p:txBody>
+          <a:bodyPr>
+            <a:normAutofit fontScale="92500" lnSpcReduction="20000"/>
+          </a:bodyPr>
+          <a:lstStyle/>
+          <a:p>
+            <a:r>
+              <a:rPr lang="en-US" dirty="0"/>
+              <a:t>A drive base has a number of degrees of freedom. A tank drive base has 2: Y-axis and rotation. A </a:t>
+            </a:r>
+            <a:r>
+              <a:rPr lang="en-US" dirty="0" err="1"/>
+              <a:t>mecanum</a:t>
+            </a:r>
+            <a:r>
+              <a:rPr lang="en-US" dirty="0"/>
+              <a:t> or swerve drive base has 3: X-axis, Y-axis and rotation.</a:t>
+            </a:r>
+          </a:p>
+          <a:p>
+            <a:r>
+              <a:rPr lang="en-US" dirty="0"/>
+              <a:t>In order to navigate a drive base, there must be a number of controllers equal to the number of degrees of freedom. TRC Library provided a generic PID controlled drive class (TrcPidDrive.java) that can PID controlled drive up to 3 degrees of freedom. Therefore, it takes up to 3 PID controllers, one for each degree of freedom: X-PID controller, Y-PID controller and Turn-PID controller.</a:t>
+            </a:r>
+          </a:p>
+          <a:p>
+            <a:r>
+              <a:rPr lang="en-US" dirty="0"/>
+              <a:t>Each PID controller must be able to get feedback on the movement along its degree of freedom. Typically, for X and Y axes, we use encoders to tell us how far the robot has moved in the corresponding axes. For rotation, we use gyro to tell us the robot’s heading. These are feedback sensors.</a:t>
+            </a:r>
+          </a:p>
+          <a:p>
+            <a:r>
+              <a:rPr lang="en-US" dirty="0"/>
+              <a:t>One could be creative on using different sensors to achieve different PID controlled drive scenarios. For example, using ultrasonic sensor as the Y-axis feedback sensor allows the robot to drive up to a given distance from an obstacle. Using a pair of distance sensors on the side of the robot as turn feedback sensors allows the robot to follow the wall. Using one or more light sensors pointing to the ground as rotation feedback sensors allows the robot to follow a line on the ground. Camera and vision processing can detect the distance and angle of your target. Using distance info as the Y-axis feedback sensor and angle info as rotation feedback sensor allows the robot to navigate and align to the target.</a:t>
+            </a:r>
+          </a:p>
+        </p:txBody>
+      </p:sp>
+    </p:spTree>
+    <p:extLst>
+      <p:ext uri="{BB962C8B-B14F-4D97-AF65-F5344CB8AC3E}">
+        <p14:creationId xmlns:p14="http://schemas.microsoft.com/office/powerpoint/2010/main" val="2582784790"/>
+      </p:ext>
+    </p:extLst>
+  </p:cSld>
+  <p:clrMapOvr>
+    <a:masterClrMapping/>
+  </p:clrMapOvr>
+</p:sld>
+</file>
+
+<file path=ppt/slides/slide6.xml><?xml version="1.0" encoding="utf-8"?>
+<p:sld xmlns:a="http://schemas.openxmlformats.org/drawingml/2006/main" xmlns:r="http://schemas.openxmlformats.org/officeDocument/2006/relationships" xmlns:p="http://schemas.openxmlformats.org/presentationml/2006/main">
+  <p:cSld>
+    <p:spTree>
+      <p:nvGrpSpPr>
+        <p:cNvPr id="1" name=""/>
+        <p:cNvGrpSpPr/>
+        <p:nvPr/>
+      </p:nvGrpSpPr>
+      <p:grpSpPr>
+        <a:xfrm>
+          <a:off x="0" y="0"/>
+          <a:ext cx="0" cy="0"/>
+          <a:chOff x="0" y="0"/>
+          <a:chExt cx="0" cy="0"/>
+        </a:xfrm>
+      </p:grpSpPr>
+      <p:sp>
+        <p:nvSpPr>
+          <p:cNvPr id="2" name="Title 1">
+            <a:extLst>
+              <a:ext uri="{FF2B5EF4-FFF2-40B4-BE49-F238E27FC236}">
+                <a16:creationId xmlns:a16="http://schemas.microsoft.com/office/drawing/2014/main" id="{F3AAD952-8A8E-4CD0-BBD6-77DC66A68A03}"/>
+              </a:ext>
+            </a:extLst>
+          </p:cNvPr>
+          <p:cNvSpPr>
+            <a:spLocks noGrp="1"/>
+          </p:cNvSpPr>
+          <p:nvPr>
+            <p:ph type="title"/>
+          </p:nvPr>
+        </p:nvSpPr>
+        <p:spPr/>
+        <p:txBody>
+          <a:bodyPr/>
+          <a:lstStyle/>
+          <a:p>
+            <a:r>
+              <a:rPr lang="en-US" dirty="0"/>
+              <a:t>PID Control Drive Using Sensors</a:t>
+            </a:r>
+          </a:p>
+        </p:txBody>
+      </p:sp>
+      <p:sp>
+        <p:nvSpPr>
+          <p:cNvPr id="3" name="Content Placeholder 2">
+            <a:extLst>
+              <a:ext uri="{FF2B5EF4-FFF2-40B4-BE49-F238E27FC236}">
+                <a16:creationId xmlns:a16="http://schemas.microsoft.com/office/drawing/2014/main" id="{9BDEE310-8036-4EF7-8E7C-F212163193B1}"/>
+              </a:ext>
+            </a:extLst>
+          </p:cNvPr>
+          <p:cNvSpPr>
+            <a:spLocks noGrp="1"/>
+          </p:cNvSpPr>
+          <p:nvPr>
+            <p:ph idx="1"/>
+          </p:nvPr>
+        </p:nvSpPr>
+        <p:spPr>
+          <a:xfrm>
+            <a:off x="528506" y="2273417"/>
+            <a:ext cx="10997967" cy="4584583"/>
+          </a:xfrm>
+        </p:spPr>
+        <p:txBody>
+          <a:bodyPr>
+            <a:normAutofit/>
+          </a:bodyPr>
+          <a:lstStyle/>
+          <a:p>
+            <a:r>
+              <a:rPr lang="en-US" dirty="0" err="1"/>
+              <a:t>TrcPidDrive</a:t>
+            </a:r>
+            <a:r>
+              <a:rPr lang="en-US" dirty="0"/>
+              <a:t> provides different drive options:</a:t>
+            </a:r>
+          </a:p>
+          <a:p>
+            <a:pPr lvl="1"/>
+            <a:r>
+              <a:rPr lang="en-US" dirty="0" err="1"/>
+              <a:t>setRelativeTarget</a:t>
+            </a:r>
+            <a:r>
+              <a:rPr lang="en-US" dirty="0"/>
+              <a:t> – Typically uses encoders as X/Y feedback sensors and gyro as heading sensor. Targets are set as relative distance from current position.</a:t>
+            </a:r>
+          </a:p>
+          <a:p>
+            <a:pPr lvl="1"/>
+            <a:r>
+              <a:rPr lang="en-US" dirty="0" err="1"/>
+              <a:t>setAbsoluteTarget</a:t>
+            </a:r>
+            <a:r>
+              <a:rPr lang="en-US" dirty="0"/>
+              <a:t> – Typically uses encoders as X/Y feedback sensors and gyro as heading sensor. Targets are absolute field position.</a:t>
+            </a:r>
+          </a:p>
+          <a:p>
+            <a:pPr lvl="1"/>
+            <a:r>
+              <a:rPr lang="en-US" dirty="0" err="1"/>
+              <a:t>setSensorTarget</a:t>
+            </a:r>
+            <a:r>
+              <a:rPr lang="en-US" dirty="0"/>
+              <a:t> – All three degrees of freedom can use any type of sensors. The target values are generally absolute sensor values. For example, using ultrasonic sensor to drive the robot to N inches in front of an obstacle, the Y target will be set as absolute N inches. Using light sensor to follow a line on the floor will set the turn target value as the absolute light value average between the white line and the dark floor. Sometimes it is useful for a PID controller to use multiple sensors to control a degree of freedom. For example, using a pair of distance sensors to control the turn target can be used to follow the wall. Just set the absolute turn target to zero and report the heading to the PID controller by subtracting the back distance sensor from the front distance sensor. Note that </a:t>
+            </a:r>
+            <a:r>
+              <a:rPr lang="en-US" dirty="0" err="1"/>
+              <a:t>AbsoluteTargetMode</a:t>
+            </a:r>
+            <a:r>
+              <a:rPr lang="en-US" dirty="0"/>
+              <a:t> cannot be used in </a:t>
+            </a:r>
+            <a:r>
+              <a:rPr lang="en-US" dirty="0" err="1"/>
+              <a:t>setSensorTarget</a:t>
+            </a:r>
+            <a:r>
+              <a:rPr lang="en-US" dirty="0"/>
+              <a:t>.</a:t>
+            </a:r>
+          </a:p>
+        </p:txBody>
+      </p:sp>
+    </p:spTree>
+    <p:extLst>
+      <p:ext uri="{BB962C8B-B14F-4D97-AF65-F5344CB8AC3E}">
+        <p14:creationId xmlns:p14="http://schemas.microsoft.com/office/powerpoint/2010/main" val="1140516568"/>
+      </p:ext>
+    </p:extLst>
+  </p:cSld>
+  <p:clrMapOvr>
+    <a:masterClrMapping/>
+  </p:clrMapOvr>
+</p:sld>
+</file>
+
+<file path=ppt/slides/slide7.xml><?xml version="1.0" encoding="utf-8"?>
+<p:sld xmlns:a="http://schemas.openxmlformats.org/drawingml/2006/main" xmlns:r="http://schemas.openxmlformats.org/officeDocument/2006/relationships" xmlns:p="http://schemas.openxmlformats.org/presentationml/2006/main">
+  <p:cSld>
+    <p:spTree>
+      <p:nvGrpSpPr>
+        <p:cNvPr id="1" name=""/>
+        <p:cNvGrpSpPr/>
+        <p:nvPr/>
+      </p:nvGrpSpPr>
+      <p:grpSpPr>
+        <a:xfrm>
+          <a:off x="0" y="0"/>
+          <a:ext cx="0" cy="0"/>
+          <a:chOff x="0" y="0"/>
+          <a:chExt cx="0" cy="0"/>
+        </a:xfrm>
+      </p:grpSpPr>
+      <p:sp>
+        <p:nvSpPr>
+          <p:cNvPr id="2" name="Title 1">
+            <a:extLst>
+              <a:ext uri="{FF2B5EF4-FFF2-40B4-BE49-F238E27FC236}">
+                <a16:creationId xmlns:a16="http://schemas.microsoft.com/office/drawing/2014/main" id="{F3AAD952-8A8E-4CD0-BBD6-77DC66A68A03}"/>
+              </a:ext>
+            </a:extLst>
+          </p:cNvPr>
+          <p:cNvSpPr>
+            <a:spLocks noGrp="1"/>
+          </p:cNvSpPr>
+          <p:nvPr>
+            <p:ph type="title"/>
+          </p:nvPr>
+        </p:nvSpPr>
+        <p:spPr>
+          <a:xfrm>
+            <a:off x="528506" y="973668"/>
+            <a:ext cx="10620463" cy="706964"/>
+          </a:xfrm>
+        </p:spPr>
+        <p:txBody>
+          <a:bodyPr/>
+          <a:lstStyle/>
+          <a:p>
+            <a:r>
+              <a:rPr lang="en-US" dirty="0"/>
+              <a:t>Exercise: Wall Following Drive</a:t>
+            </a:r>
+          </a:p>
+        </p:txBody>
+      </p:sp>
+      <p:sp>
+        <p:nvSpPr>
+          <p:cNvPr id="3" name="Content Placeholder 2">
+            <a:extLst>
+              <a:ext uri="{FF2B5EF4-FFF2-40B4-BE49-F238E27FC236}">
+                <a16:creationId xmlns:a16="http://schemas.microsoft.com/office/drawing/2014/main" id="{9BDEE310-8036-4EF7-8E7C-F212163193B1}"/>
+              </a:ext>
+            </a:extLst>
+          </p:cNvPr>
+          <p:cNvSpPr>
+            <a:spLocks noGrp="1"/>
+          </p:cNvSpPr>
+          <p:nvPr>
+            <p:ph idx="1"/>
+          </p:nvPr>
+        </p:nvSpPr>
+        <p:spPr>
+          <a:xfrm>
+            <a:off x="528506" y="2273417"/>
+            <a:ext cx="11026185" cy="4584583"/>
+          </a:xfrm>
+        </p:spPr>
+        <p:txBody>
+          <a:bodyPr>
+            <a:normAutofit/>
+          </a:bodyPr>
+          <a:lstStyle/>
+          <a:p>
+            <a:r>
+              <a:rPr lang="en-US" dirty="0"/>
+              <a:t>Assuming the robot is 12 inches from the wall on the right side. Use two distance sensors to drive the robot following the wall for 10 feet.</a:t>
+            </a:r>
+          </a:p>
+          <a:p>
+            <a:pPr lvl="1"/>
+            <a:r>
+              <a:rPr lang="en-US" dirty="0"/>
+              <a:t>In previous exercises, you have already created a </a:t>
+            </a:r>
+            <a:r>
+              <a:rPr lang="en-US" dirty="0" err="1"/>
+              <a:t>mecanum</a:t>
+            </a:r>
+            <a:r>
+              <a:rPr lang="en-US" dirty="0"/>
+              <a:t> drive base.</a:t>
+            </a:r>
+          </a:p>
+          <a:p>
+            <a:pPr lvl="1"/>
+            <a:r>
+              <a:rPr lang="en-US" dirty="0"/>
+              <a:t>In Robot.java, add code to </a:t>
+            </a:r>
+            <a:r>
+              <a:rPr lang="en-US" dirty="0" err="1"/>
+              <a:t>robotInit</a:t>
+            </a:r>
+            <a:r>
+              <a:rPr lang="en-US" dirty="0"/>
+              <a:t> to create two distance sensor objects such as the </a:t>
+            </a:r>
+            <a:r>
+              <a:rPr lang="en-US" dirty="0" err="1"/>
+              <a:t>FrcLaserShark</a:t>
+            </a:r>
+            <a:r>
+              <a:rPr lang="en-US" dirty="0"/>
+              <a:t>.</a:t>
+            </a:r>
+          </a:p>
+          <a:p>
+            <a:pPr lvl="1"/>
+            <a:r>
+              <a:rPr lang="en-US" dirty="0"/>
+              <a:t>Create three PID controllers:</a:t>
+            </a:r>
+          </a:p>
+          <a:p>
+            <a:pPr lvl="2"/>
+            <a:r>
+              <a:rPr lang="en-US" dirty="0"/>
+              <a:t>X PID controller averages the two distance sensors to control the X distance from the wall.</a:t>
+            </a:r>
+          </a:p>
+          <a:p>
+            <a:pPr lvl="2"/>
+            <a:r>
+              <a:rPr lang="en-US" dirty="0"/>
+              <a:t>Y PID controller uses the drive base encoders to control the Y distance to travel.</a:t>
+            </a:r>
+          </a:p>
+          <a:p>
+            <a:pPr lvl="2"/>
+            <a:r>
+              <a:rPr lang="en-US" dirty="0"/>
+              <a:t>Turn PID controller uses the difference of the distance sensors to control the heading of the robot.</a:t>
+            </a:r>
+          </a:p>
+          <a:p>
+            <a:pPr lvl="1"/>
+            <a:r>
+              <a:rPr lang="en-US" dirty="0"/>
+              <a:t>Create a PID drive using the three PID controllers.</a:t>
+            </a:r>
+          </a:p>
+          <a:p>
+            <a:pPr lvl="1"/>
+            <a:r>
+              <a:rPr lang="en-US" dirty="0"/>
+              <a:t>In FrcTeleOp.java, add code to </a:t>
+            </a:r>
+            <a:r>
+              <a:rPr lang="en-US" dirty="0" err="1"/>
+              <a:t>driverControllerButtonEvent</a:t>
+            </a:r>
+            <a:r>
+              <a:rPr lang="en-US" dirty="0"/>
+              <a:t> to follow the wall 12 inches away for 10 feet by pressing button A.</a:t>
+            </a:r>
+          </a:p>
+          <a:p>
+            <a:pPr lvl="1"/>
+            <a:r>
+              <a:rPr lang="en-US" dirty="0"/>
+              <a:t>In FrcTeleOp.java, add code to periodic to print the robot location as well as the two distance sensor readings on the dashboard.</a:t>
+            </a:r>
+          </a:p>
+        </p:txBody>
+      </p:sp>
+    </p:spTree>
+    <p:extLst>
+      <p:ext uri="{BB962C8B-B14F-4D97-AF65-F5344CB8AC3E}">
+        <p14:creationId xmlns:p14="http://schemas.microsoft.com/office/powerpoint/2010/main" val="3636198044"/>
+      </p:ext>
+    </p:extLst>
+  </p:cSld>
+  <p:clrMapOvr>
+    <a:masterClrMapping/>
+  </p:clrMapOvr>
+</p:sld>
+</file>
+
+<file path=ppt/slides/slide8.xml><?xml version="1.0" encoding="utf-8"?>
+<p:sld xmlns:a="http://schemas.openxmlformats.org/drawingml/2006/main" xmlns:r="http://schemas.openxmlformats.org/officeDocument/2006/relationships" xmlns:p="http://schemas.openxmlformats.org/presentationml/2006/main">
+  <p:cSld>
+    <p:spTree>
+      <p:nvGrpSpPr>
+        <p:cNvPr id="1" name=""/>
+        <p:cNvGrpSpPr/>
+        <p:nvPr/>
+      </p:nvGrpSpPr>
+      <p:grpSpPr>
+        <a:xfrm>
+          <a:off x="0" y="0"/>
+          <a:ext cx="0" cy="0"/>
+          <a:chOff x="0" y="0"/>
+          <a:chExt cx="0" cy="0"/>
+        </a:xfrm>
+      </p:grpSpPr>
+      <p:sp>
+        <p:nvSpPr>
+          <p:cNvPr id="2" name="Title 1">
+            <a:extLst>
+              <a:ext uri="{FF2B5EF4-FFF2-40B4-BE49-F238E27FC236}">
                 <a16:creationId xmlns:a16="http://schemas.microsoft.com/office/drawing/2014/main" id="{FD11B5CC-4835-453C-A213-00670C0634B7}"/>
               </a:ext>
             </a:extLst>
@@ -15411,7 +16834,7 @@
 </p:sld>
 </file>
 
-<file path=ppt/slides/slide6.xml><?xml version="1.0" encoding="utf-8"?>
+<file path=ppt/slides/slide9.xml><?xml version="1.0" encoding="utf-8"?>
 <p:sld xmlns:a="http://schemas.openxmlformats.org/drawingml/2006/main" xmlns:r="http://schemas.openxmlformats.org/officeDocument/2006/relationships" xmlns:p="http://schemas.openxmlformats.org/presentationml/2006/main">
   <p:cSld>
     <p:spTree>
@@ -15523,1279 +16946,6 @@
     <p:extLst>
       <p:ext uri="{BB962C8B-B14F-4D97-AF65-F5344CB8AC3E}">
         <p14:creationId xmlns:p14="http://schemas.microsoft.com/office/powerpoint/2010/main" val="2423236713"/>
-      </p:ext>
-    </p:extLst>
-  </p:cSld>
-  <p:clrMapOvr>
-    <a:masterClrMapping/>
-  </p:clrMapOvr>
-</p:sld>
-</file>
-
-<file path=ppt/slides/slide7.xml><?xml version="1.0" encoding="utf-8"?>
-<p:sld xmlns:a="http://schemas.openxmlformats.org/drawingml/2006/main" xmlns:r="http://schemas.openxmlformats.org/officeDocument/2006/relationships" xmlns:p="http://schemas.openxmlformats.org/presentationml/2006/main">
-  <p:cSld>
-    <p:spTree>
-      <p:nvGrpSpPr>
-        <p:cNvPr id="1" name=""/>
-        <p:cNvGrpSpPr/>
-        <p:nvPr/>
-      </p:nvGrpSpPr>
-      <p:grpSpPr>
-        <a:xfrm>
-          <a:off x="0" y="0"/>
-          <a:ext cx="0" cy="0"/>
-          <a:chOff x="0" y="0"/>
-          <a:chExt cx="0" cy="0"/>
-        </a:xfrm>
-      </p:grpSpPr>
-      <p:sp>
-        <p:nvSpPr>
-          <p:cNvPr id="2" name="Title 1">
-            <a:extLst>
-              <a:ext uri="{FF2B5EF4-FFF2-40B4-BE49-F238E27FC236}">
-                <a16:creationId xmlns:a16="http://schemas.microsoft.com/office/drawing/2014/main" id="{09F4C2DE-1E97-4D6C-B924-24333C07B33A}"/>
-              </a:ext>
-            </a:extLst>
-          </p:cNvPr>
-          <p:cNvSpPr>
-            <a:spLocks noGrp="1"/>
-          </p:cNvSpPr>
-          <p:nvPr>
-            <p:ph type="title"/>
-          </p:nvPr>
-        </p:nvSpPr>
-        <p:spPr/>
-        <p:txBody>
-          <a:bodyPr/>
-          <a:lstStyle/>
-          <a:p>
-            <a:r>
-              <a:rPr lang="en-US" dirty="0"/>
-              <a:t>Using Pure Pursuit Drive</a:t>
-            </a:r>
-          </a:p>
-        </p:txBody>
-      </p:sp>
-      <p:sp>
-        <p:nvSpPr>
-          <p:cNvPr id="3" name="Content Placeholder 2">
-            <a:extLst>
-              <a:ext uri="{FF2B5EF4-FFF2-40B4-BE49-F238E27FC236}">
-                <a16:creationId xmlns:a16="http://schemas.microsoft.com/office/drawing/2014/main" id="{EA1D6505-D893-49E8-8118-580F873467C0}"/>
-              </a:ext>
-            </a:extLst>
-          </p:cNvPr>
-          <p:cNvSpPr>
-            <a:spLocks noGrp="1"/>
-          </p:cNvSpPr>
-          <p:nvPr>
-            <p:ph idx="1"/>
-          </p:nvPr>
-        </p:nvSpPr>
-        <p:spPr>
-          <a:xfrm>
-            <a:off x="553673" y="2273417"/>
-            <a:ext cx="11039911" cy="4477007"/>
-          </a:xfrm>
-        </p:spPr>
-        <p:txBody>
-          <a:bodyPr>
-            <a:normAutofit/>
-          </a:bodyPr>
-          <a:lstStyle/>
-          <a:p>
-            <a:r>
-              <a:rPr lang="en-US" dirty="0" err="1"/>
-              <a:t>TrcHolonomicPurePursuitDrive</a:t>
-            </a:r>
-            <a:r>
-              <a:rPr lang="en-US" dirty="0"/>
-              <a:t> Constructor:</a:t>
-            </a:r>
-            <a:br>
-              <a:rPr lang="en-US" dirty="0"/>
-            </a:br>
-            <a:r>
-              <a:rPr lang="en-US" b="0" dirty="0" err="1">
-                <a:solidFill>
-                  <a:srgbClr val="DCDCAA"/>
-                </a:solidFill>
-                <a:effectLst/>
-                <a:latin typeface="Consolas" panose="020B0609020204030204" pitchFamily="49" charset="0"/>
-              </a:rPr>
-              <a:t>TrcPurePursuitDrive</a:t>
-            </a:r>
-            <a:r>
-              <a:rPr lang="en-US" b="0" dirty="0">
-                <a:solidFill>
-                  <a:srgbClr val="D4D4D4"/>
-                </a:solidFill>
-                <a:effectLst/>
-                <a:latin typeface="Consolas" panose="020B0609020204030204" pitchFamily="49" charset="0"/>
-              </a:rPr>
-              <a:t>(</a:t>
-            </a:r>
-            <a:r>
-              <a:rPr lang="en-US" b="0" dirty="0">
-                <a:solidFill>
-                  <a:srgbClr val="4EC9B0"/>
-                </a:solidFill>
-                <a:effectLst/>
-                <a:latin typeface="Consolas" panose="020B0609020204030204" pitchFamily="49" charset="0"/>
-              </a:rPr>
-              <a:t>String</a:t>
-            </a:r>
-            <a:r>
-              <a:rPr lang="en-US" b="0" dirty="0">
-                <a:solidFill>
-                  <a:srgbClr val="D4D4D4"/>
-                </a:solidFill>
-                <a:effectLst/>
-                <a:latin typeface="Consolas" panose="020B0609020204030204" pitchFamily="49" charset="0"/>
-              </a:rPr>
-              <a:t> </a:t>
-            </a:r>
-            <a:r>
-              <a:rPr lang="en-US" b="0" dirty="0" err="1">
-                <a:solidFill>
-                  <a:srgbClr val="9CDCFE"/>
-                </a:solidFill>
-                <a:effectLst/>
-                <a:latin typeface="Consolas" panose="020B0609020204030204" pitchFamily="49" charset="0"/>
-              </a:rPr>
-              <a:t>instanceName</a:t>
-            </a:r>
-            <a:r>
-              <a:rPr lang="en-US" b="0" dirty="0">
-                <a:solidFill>
-                  <a:srgbClr val="D4D4D4"/>
-                </a:solidFill>
-                <a:effectLst/>
-                <a:latin typeface="Consolas" panose="020B0609020204030204" pitchFamily="49" charset="0"/>
-              </a:rPr>
-              <a:t>, </a:t>
-            </a:r>
-            <a:r>
-              <a:rPr lang="en-US" b="0" dirty="0" err="1">
-                <a:solidFill>
-                  <a:srgbClr val="4EC9B0"/>
-                </a:solidFill>
-                <a:effectLst/>
-                <a:latin typeface="Consolas" panose="020B0609020204030204" pitchFamily="49" charset="0"/>
-              </a:rPr>
-              <a:t>TrcDriveBase</a:t>
-            </a:r>
-            <a:r>
-              <a:rPr lang="en-US" b="0" dirty="0">
-                <a:solidFill>
-                  <a:srgbClr val="D4D4D4"/>
-                </a:solidFill>
-                <a:effectLst/>
-                <a:latin typeface="Consolas" panose="020B0609020204030204" pitchFamily="49" charset="0"/>
-              </a:rPr>
-              <a:t> </a:t>
-            </a:r>
-            <a:r>
-              <a:rPr lang="en-US" b="0" dirty="0" err="1">
-                <a:solidFill>
-                  <a:srgbClr val="9CDCFE"/>
-                </a:solidFill>
-                <a:effectLst/>
-                <a:latin typeface="Consolas" panose="020B0609020204030204" pitchFamily="49" charset="0"/>
-              </a:rPr>
-              <a:t>driveBase</a:t>
-            </a:r>
-            <a:r>
-              <a:rPr lang="en-US" b="0" dirty="0">
-                <a:solidFill>
-                  <a:srgbClr val="D4D4D4"/>
-                </a:solidFill>
-                <a:effectLst/>
-                <a:latin typeface="Consolas" panose="020B0609020204030204" pitchFamily="49" charset="0"/>
-              </a:rPr>
-              <a:t>, </a:t>
-            </a:r>
-            <a:r>
-              <a:rPr lang="en-US" b="0" dirty="0">
-                <a:solidFill>
-                  <a:srgbClr val="4EC9B0"/>
-                </a:solidFill>
-                <a:effectLst/>
-                <a:latin typeface="Consolas" panose="020B0609020204030204" pitchFamily="49" charset="0"/>
-              </a:rPr>
-              <a:t>double</a:t>
-            </a:r>
-            <a:r>
-              <a:rPr lang="en-US" b="0" dirty="0">
-                <a:solidFill>
-                  <a:srgbClr val="D4D4D4"/>
-                </a:solidFill>
-                <a:effectLst/>
-                <a:latin typeface="Consolas" panose="020B0609020204030204" pitchFamily="49" charset="0"/>
-              </a:rPr>
-              <a:t> </a:t>
-            </a:r>
-            <a:r>
-              <a:rPr lang="en-US" b="0" dirty="0" err="1">
-                <a:solidFill>
-                  <a:srgbClr val="9CDCFE"/>
-                </a:solidFill>
-                <a:effectLst/>
-                <a:latin typeface="Consolas" panose="020B0609020204030204" pitchFamily="49" charset="0"/>
-              </a:rPr>
-              <a:t>proximityRadius</a:t>
-            </a:r>
-            <a:r>
-              <a:rPr lang="en-US" b="0" dirty="0">
-                <a:solidFill>
-                  <a:srgbClr val="D4D4D4"/>
-                </a:solidFill>
-                <a:effectLst/>
-                <a:latin typeface="Consolas" panose="020B0609020204030204" pitchFamily="49" charset="0"/>
-              </a:rPr>
-              <a:t>, </a:t>
-            </a:r>
-            <a:r>
-              <a:rPr lang="en-US" b="0" dirty="0">
-                <a:solidFill>
-                  <a:srgbClr val="4EC9B0"/>
-                </a:solidFill>
-                <a:effectLst/>
-                <a:latin typeface="Consolas" panose="020B0609020204030204" pitchFamily="49" charset="0"/>
-              </a:rPr>
-              <a:t>double</a:t>
-            </a:r>
-            <a:r>
-              <a:rPr lang="en-US" b="0" dirty="0">
-                <a:solidFill>
-                  <a:srgbClr val="D4D4D4"/>
-                </a:solidFill>
-                <a:effectLst/>
-                <a:latin typeface="Consolas" panose="020B0609020204030204" pitchFamily="49" charset="0"/>
-              </a:rPr>
-              <a:t> </a:t>
-            </a:r>
-            <a:r>
-              <a:rPr lang="en-US" b="0" dirty="0" err="1">
-                <a:solidFill>
-                  <a:srgbClr val="9CDCFE"/>
-                </a:solidFill>
-                <a:effectLst/>
-                <a:latin typeface="Consolas" panose="020B0609020204030204" pitchFamily="49" charset="0"/>
-              </a:rPr>
-              <a:t>posTolerance</a:t>
-            </a:r>
-            <a:r>
-              <a:rPr lang="en-US" b="0" dirty="0">
-                <a:solidFill>
-                  <a:srgbClr val="D4D4D4"/>
-                </a:solidFill>
-                <a:effectLst/>
-                <a:latin typeface="Consolas" panose="020B0609020204030204" pitchFamily="49" charset="0"/>
-              </a:rPr>
-              <a:t>, </a:t>
-            </a:r>
-            <a:r>
-              <a:rPr lang="en-US" b="0" dirty="0">
-                <a:solidFill>
-                  <a:srgbClr val="4EC9B0"/>
-                </a:solidFill>
-                <a:effectLst/>
-                <a:latin typeface="Consolas" panose="020B0609020204030204" pitchFamily="49" charset="0"/>
-              </a:rPr>
-              <a:t>double</a:t>
-            </a:r>
-            <a:r>
-              <a:rPr lang="en-US" b="0" dirty="0">
-                <a:solidFill>
-                  <a:srgbClr val="D4D4D4"/>
-                </a:solidFill>
-                <a:effectLst/>
-                <a:latin typeface="Consolas" panose="020B0609020204030204" pitchFamily="49" charset="0"/>
-              </a:rPr>
-              <a:t> </a:t>
-            </a:r>
-            <a:r>
-              <a:rPr lang="en-US" b="0" dirty="0" err="1">
-                <a:solidFill>
-                  <a:srgbClr val="9CDCFE"/>
-                </a:solidFill>
-                <a:effectLst/>
-                <a:latin typeface="Consolas" panose="020B0609020204030204" pitchFamily="49" charset="0"/>
-              </a:rPr>
-              <a:t>turnTolerance</a:t>
-            </a:r>
-            <a:r>
-              <a:rPr lang="en-US" b="0" dirty="0">
-                <a:solidFill>
-                  <a:srgbClr val="D4D4D4"/>
-                </a:solidFill>
-                <a:effectLst/>
-                <a:latin typeface="Consolas" panose="020B0609020204030204" pitchFamily="49" charset="0"/>
-              </a:rPr>
-              <a:t>, </a:t>
-            </a:r>
-            <a:r>
-              <a:rPr lang="en-US" b="0" dirty="0" err="1">
-                <a:solidFill>
-                  <a:srgbClr val="4EC9B0"/>
-                </a:solidFill>
-                <a:effectLst/>
-                <a:latin typeface="Consolas" panose="020B0609020204030204" pitchFamily="49" charset="0"/>
-              </a:rPr>
-              <a:t>TrcPidController</a:t>
-            </a:r>
-            <a:r>
-              <a:rPr lang="en-US" b="0" dirty="0" err="1">
-                <a:solidFill>
-                  <a:srgbClr val="D4D4D4"/>
-                </a:solidFill>
-                <a:effectLst/>
-                <a:latin typeface="Consolas" panose="020B0609020204030204" pitchFamily="49" charset="0"/>
-              </a:rPr>
-              <a:t>.</a:t>
-            </a:r>
-            <a:r>
-              <a:rPr lang="en-US" b="0" dirty="0" err="1">
-                <a:solidFill>
-                  <a:srgbClr val="4EC9B0"/>
-                </a:solidFill>
-                <a:effectLst/>
-                <a:latin typeface="Consolas" panose="020B0609020204030204" pitchFamily="49" charset="0"/>
-              </a:rPr>
-              <a:t>PidCoefficients</a:t>
-            </a:r>
-            <a:r>
-              <a:rPr lang="en-US" b="0" dirty="0">
-                <a:solidFill>
-                  <a:srgbClr val="D4D4D4"/>
-                </a:solidFill>
-                <a:effectLst/>
-                <a:latin typeface="Consolas" panose="020B0609020204030204" pitchFamily="49" charset="0"/>
-              </a:rPr>
-              <a:t> </a:t>
-            </a:r>
-            <a:r>
-              <a:rPr lang="en-US" b="0" dirty="0" err="1">
-                <a:solidFill>
-                  <a:srgbClr val="9CDCFE"/>
-                </a:solidFill>
-                <a:effectLst/>
-                <a:latin typeface="Consolas" panose="020B0609020204030204" pitchFamily="49" charset="0"/>
-              </a:rPr>
-              <a:t>xPosPidCoeff</a:t>
-            </a:r>
-            <a:r>
-              <a:rPr lang="en-US" b="0" dirty="0">
-                <a:solidFill>
-                  <a:srgbClr val="D4D4D4"/>
-                </a:solidFill>
-                <a:effectLst/>
-                <a:latin typeface="Consolas" panose="020B0609020204030204" pitchFamily="49" charset="0"/>
-              </a:rPr>
-              <a:t>, </a:t>
-            </a:r>
-            <a:r>
-              <a:rPr lang="en-US" b="0" dirty="0" err="1">
-                <a:solidFill>
-                  <a:srgbClr val="4EC9B0"/>
-                </a:solidFill>
-                <a:effectLst/>
-                <a:latin typeface="Consolas" panose="020B0609020204030204" pitchFamily="49" charset="0"/>
-              </a:rPr>
-              <a:t>TrcPidController</a:t>
-            </a:r>
-            <a:r>
-              <a:rPr lang="en-US" b="0" dirty="0" err="1">
-                <a:solidFill>
-                  <a:srgbClr val="D4D4D4"/>
-                </a:solidFill>
-                <a:effectLst/>
-                <a:latin typeface="Consolas" panose="020B0609020204030204" pitchFamily="49" charset="0"/>
-              </a:rPr>
-              <a:t>.</a:t>
-            </a:r>
-            <a:r>
-              <a:rPr lang="en-US" b="0" dirty="0" err="1">
-                <a:solidFill>
-                  <a:srgbClr val="4EC9B0"/>
-                </a:solidFill>
-                <a:effectLst/>
-                <a:latin typeface="Consolas" panose="020B0609020204030204" pitchFamily="49" charset="0"/>
-              </a:rPr>
-              <a:t>PidCoefficients</a:t>
-            </a:r>
-            <a:r>
-              <a:rPr lang="en-US" b="0" dirty="0">
-                <a:solidFill>
-                  <a:srgbClr val="D4D4D4"/>
-                </a:solidFill>
-                <a:effectLst/>
-                <a:latin typeface="Consolas" panose="020B0609020204030204" pitchFamily="49" charset="0"/>
-              </a:rPr>
-              <a:t> </a:t>
-            </a:r>
-            <a:r>
-              <a:rPr lang="en-US" b="0" dirty="0" err="1">
-                <a:solidFill>
-                  <a:srgbClr val="9CDCFE"/>
-                </a:solidFill>
-                <a:effectLst/>
-                <a:latin typeface="Consolas" panose="020B0609020204030204" pitchFamily="49" charset="0"/>
-              </a:rPr>
-              <a:t>yPosPidCoeff</a:t>
-            </a:r>
-            <a:r>
-              <a:rPr lang="en-US" b="0" dirty="0">
-                <a:solidFill>
-                  <a:srgbClr val="D4D4D4"/>
-                </a:solidFill>
-                <a:effectLst/>
-                <a:latin typeface="Consolas" panose="020B0609020204030204" pitchFamily="49" charset="0"/>
-              </a:rPr>
-              <a:t>, </a:t>
-            </a:r>
-            <a:r>
-              <a:rPr lang="en-US" b="0" dirty="0" err="1">
-                <a:solidFill>
-                  <a:srgbClr val="4EC9B0"/>
-                </a:solidFill>
-                <a:effectLst/>
-                <a:latin typeface="Consolas" panose="020B0609020204030204" pitchFamily="49" charset="0"/>
-              </a:rPr>
-              <a:t>TrcPidController</a:t>
-            </a:r>
-            <a:r>
-              <a:rPr lang="en-US" b="0" dirty="0" err="1">
-                <a:solidFill>
-                  <a:srgbClr val="D4D4D4"/>
-                </a:solidFill>
-                <a:effectLst/>
-                <a:latin typeface="Consolas" panose="020B0609020204030204" pitchFamily="49" charset="0"/>
-              </a:rPr>
-              <a:t>.</a:t>
-            </a:r>
-            <a:r>
-              <a:rPr lang="en-US" b="0" dirty="0" err="1">
-                <a:solidFill>
-                  <a:srgbClr val="4EC9B0"/>
-                </a:solidFill>
-                <a:effectLst/>
-                <a:latin typeface="Consolas" panose="020B0609020204030204" pitchFamily="49" charset="0"/>
-              </a:rPr>
-              <a:t>PidCoefficients</a:t>
-            </a:r>
-            <a:r>
-              <a:rPr lang="en-US" b="0" dirty="0">
-                <a:solidFill>
-                  <a:srgbClr val="D4D4D4"/>
-                </a:solidFill>
-                <a:effectLst/>
-                <a:latin typeface="Consolas" panose="020B0609020204030204" pitchFamily="49" charset="0"/>
-              </a:rPr>
-              <a:t> </a:t>
-            </a:r>
-            <a:r>
-              <a:rPr lang="en-US" b="0" dirty="0" err="1">
-                <a:solidFill>
-                  <a:srgbClr val="9CDCFE"/>
-                </a:solidFill>
-                <a:effectLst/>
-                <a:latin typeface="Consolas" panose="020B0609020204030204" pitchFamily="49" charset="0"/>
-              </a:rPr>
-              <a:t>turnPidCoeff</a:t>
-            </a:r>
-            <a:r>
-              <a:rPr lang="en-US" b="0" dirty="0">
-                <a:solidFill>
-                  <a:srgbClr val="D4D4D4"/>
-                </a:solidFill>
-                <a:effectLst/>
-                <a:latin typeface="Consolas" panose="020B0609020204030204" pitchFamily="49" charset="0"/>
-              </a:rPr>
-              <a:t>, </a:t>
-            </a:r>
-            <a:r>
-              <a:rPr lang="en-US" b="0" dirty="0" err="1">
-                <a:solidFill>
-                  <a:srgbClr val="4EC9B0"/>
-                </a:solidFill>
-                <a:effectLst/>
-                <a:latin typeface="Consolas" panose="020B0609020204030204" pitchFamily="49" charset="0"/>
-              </a:rPr>
-              <a:t>TrcPidController</a:t>
-            </a:r>
-            <a:r>
-              <a:rPr lang="en-US" b="0" dirty="0" err="1">
-                <a:solidFill>
-                  <a:srgbClr val="D4D4D4"/>
-                </a:solidFill>
-                <a:effectLst/>
-                <a:latin typeface="Consolas" panose="020B0609020204030204" pitchFamily="49" charset="0"/>
-              </a:rPr>
-              <a:t>.</a:t>
-            </a:r>
-            <a:r>
-              <a:rPr lang="en-US" b="0" dirty="0" err="1">
-                <a:solidFill>
-                  <a:srgbClr val="4EC9B0"/>
-                </a:solidFill>
-                <a:effectLst/>
-                <a:latin typeface="Consolas" panose="020B0609020204030204" pitchFamily="49" charset="0"/>
-              </a:rPr>
-              <a:t>PidCoefficients</a:t>
-            </a:r>
-            <a:r>
-              <a:rPr lang="en-US" b="0" dirty="0">
-                <a:solidFill>
-                  <a:srgbClr val="D4D4D4"/>
-                </a:solidFill>
-                <a:effectLst/>
-                <a:latin typeface="Consolas" panose="020B0609020204030204" pitchFamily="49" charset="0"/>
-              </a:rPr>
-              <a:t> </a:t>
-            </a:r>
-            <a:r>
-              <a:rPr lang="en-US" b="0" dirty="0" err="1">
-                <a:solidFill>
-                  <a:srgbClr val="9CDCFE"/>
-                </a:solidFill>
-                <a:effectLst/>
-                <a:latin typeface="Consolas" panose="020B0609020204030204" pitchFamily="49" charset="0"/>
-              </a:rPr>
-              <a:t>velPidCoeff</a:t>
-            </a:r>
-            <a:r>
-              <a:rPr lang="en-US" b="0" dirty="0">
-                <a:solidFill>
-                  <a:srgbClr val="D4D4D4"/>
-                </a:solidFill>
-                <a:effectLst/>
-                <a:latin typeface="Consolas" panose="020B0609020204030204" pitchFamily="49" charset="0"/>
-              </a:rPr>
-              <a:t>)</a:t>
-            </a:r>
-            <a:endParaRPr lang="en-US" dirty="0"/>
-          </a:p>
-          <a:p>
-            <a:r>
-              <a:rPr lang="en-US" dirty="0"/>
-              <a:t>Methods:</a:t>
-            </a:r>
-          </a:p>
-          <a:p>
-            <a:pPr lvl="1"/>
-            <a:r>
-              <a:rPr lang="en-US" dirty="0"/>
-              <a:t>Some setter methods to set various parameters of Pure Pursuit Drive: e.g. following distance, tolerances, PID coefficients, interpolation types etc.</a:t>
-            </a:r>
-          </a:p>
-          <a:p>
-            <a:pPr lvl="1"/>
-            <a:r>
-              <a:rPr lang="en-US" dirty="0" err="1"/>
-              <a:t>isActive</a:t>
-            </a:r>
-            <a:r>
-              <a:rPr lang="en-US" dirty="0"/>
-              <a:t> – check if Pure Pursuit Drive is in progress.</a:t>
-            </a:r>
-          </a:p>
-          <a:p>
-            <a:pPr lvl="1"/>
-            <a:r>
-              <a:rPr lang="en-US" dirty="0"/>
-              <a:t>cancel – cancel the Pure Pursuit Drive that is in progress.</a:t>
-            </a:r>
-          </a:p>
-          <a:p>
-            <a:pPr lvl="1"/>
-            <a:r>
-              <a:rPr lang="en-US" dirty="0"/>
-              <a:t>start – start the pure pursuit drive with the specified path.</a:t>
-            </a:r>
-            <a:br>
-              <a:rPr lang="en-US" dirty="0"/>
-            </a:br>
-            <a:r>
-              <a:rPr lang="en-US" b="0" dirty="0">
-                <a:solidFill>
-                  <a:srgbClr val="4EC9B0"/>
-                </a:solidFill>
-                <a:effectLst/>
-                <a:latin typeface="Consolas" panose="020B0609020204030204" pitchFamily="49" charset="0"/>
-              </a:rPr>
-              <a:t>void</a:t>
-            </a:r>
-            <a:r>
-              <a:rPr lang="en-US" b="0" dirty="0">
-                <a:solidFill>
-                  <a:srgbClr val="D4D4D4"/>
-                </a:solidFill>
-                <a:effectLst/>
-                <a:latin typeface="Consolas" panose="020B0609020204030204" pitchFamily="49" charset="0"/>
-              </a:rPr>
-              <a:t> </a:t>
-            </a:r>
-            <a:r>
-              <a:rPr lang="en-US" b="0" dirty="0">
-                <a:solidFill>
-                  <a:srgbClr val="DCDCAA"/>
-                </a:solidFill>
-                <a:effectLst/>
-                <a:latin typeface="Consolas" panose="020B0609020204030204" pitchFamily="49" charset="0"/>
-              </a:rPr>
-              <a:t>start</a:t>
-            </a:r>
-            <a:r>
-              <a:rPr lang="en-US" b="0" dirty="0">
-                <a:solidFill>
-                  <a:srgbClr val="D4D4D4"/>
-                </a:solidFill>
-                <a:effectLst/>
-                <a:latin typeface="Consolas" panose="020B0609020204030204" pitchFamily="49" charset="0"/>
-              </a:rPr>
-              <a:t>(</a:t>
-            </a:r>
-            <a:r>
-              <a:rPr lang="en-US" b="0" dirty="0" err="1">
-                <a:solidFill>
-                  <a:srgbClr val="4EC9B0"/>
-                </a:solidFill>
-                <a:effectLst/>
-                <a:latin typeface="Consolas" panose="020B0609020204030204" pitchFamily="49" charset="0"/>
-              </a:rPr>
-              <a:t>TrcPath</a:t>
-            </a:r>
-            <a:r>
-              <a:rPr lang="en-US" b="0" dirty="0">
-                <a:solidFill>
-                  <a:srgbClr val="D4D4D4"/>
-                </a:solidFill>
-                <a:effectLst/>
-                <a:latin typeface="Consolas" panose="020B0609020204030204" pitchFamily="49" charset="0"/>
-              </a:rPr>
-              <a:t> </a:t>
-            </a:r>
-            <a:r>
-              <a:rPr lang="en-US" b="0" dirty="0">
-                <a:solidFill>
-                  <a:srgbClr val="9CDCFE"/>
-                </a:solidFill>
-                <a:effectLst/>
-                <a:latin typeface="Consolas" panose="020B0609020204030204" pitchFamily="49" charset="0"/>
-              </a:rPr>
-              <a:t>path</a:t>
-            </a:r>
-            <a:r>
-              <a:rPr lang="en-US" b="0" dirty="0">
-                <a:solidFill>
-                  <a:srgbClr val="D4D4D4"/>
-                </a:solidFill>
-                <a:effectLst/>
-                <a:latin typeface="Consolas" panose="020B0609020204030204" pitchFamily="49" charset="0"/>
-              </a:rPr>
-              <a:t>, </a:t>
-            </a:r>
-            <a:r>
-              <a:rPr lang="en-US" b="0" dirty="0" err="1">
-                <a:solidFill>
-                  <a:srgbClr val="4EC9B0"/>
-                </a:solidFill>
-                <a:effectLst/>
-                <a:latin typeface="Consolas" panose="020B0609020204030204" pitchFamily="49" charset="0"/>
-              </a:rPr>
-              <a:t>TrcEvent</a:t>
-            </a:r>
-            <a:r>
-              <a:rPr lang="en-US" b="0" dirty="0">
-                <a:solidFill>
-                  <a:srgbClr val="D4D4D4"/>
-                </a:solidFill>
-                <a:effectLst/>
-                <a:latin typeface="Consolas" panose="020B0609020204030204" pitchFamily="49" charset="0"/>
-              </a:rPr>
-              <a:t> </a:t>
-            </a:r>
-            <a:r>
-              <a:rPr lang="en-US" b="0" dirty="0">
-                <a:solidFill>
-                  <a:srgbClr val="9CDCFE"/>
-                </a:solidFill>
-                <a:effectLst/>
-                <a:latin typeface="Consolas" panose="020B0609020204030204" pitchFamily="49" charset="0"/>
-              </a:rPr>
-              <a:t>event</a:t>
-            </a:r>
-            <a:r>
-              <a:rPr lang="en-US" b="0" dirty="0">
-                <a:solidFill>
-                  <a:srgbClr val="D4D4D4"/>
-                </a:solidFill>
-                <a:effectLst/>
-                <a:latin typeface="Consolas" panose="020B0609020204030204" pitchFamily="49" charset="0"/>
-              </a:rPr>
-              <a:t>, </a:t>
-            </a:r>
-            <a:r>
-              <a:rPr lang="en-US" b="0" dirty="0">
-                <a:solidFill>
-                  <a:srgbClr val="4EC9B0"/>
-                </a:solidFill>
-                <a:effectLst/>
-                <a:latin typeface="Consolas" panose="020B0609020204030204" pitchFamily="49" charset="0"/>
-              </a:rPr>
-              <a:t>double</a:t>
-            </a:r>
-            <a:r>
-              <a:rPr lang="en-US" b="0" dirty="0">
-                <a:solidFill>
-                  <a:srgbClr val="D4D4D4"/>
-                </a:solidFill>
-                <a:effectLst/>
-                <a:latin typeface="Consolas" panose="020B0609020204030204" pitchFamily="49" charset="0"/>
-              </a:rPr>
-              <a:t> </a:t>
-            </a:r>
-            <a:r>
-              <a:rPr lang="en-US" b="0" dirty="0">
-                <a:solidFill>
-                  <a:srgbClr val="9CDCFE"/>
-                </a:solidFill>
-                <a:effectLst/>
-                <a:latin typeface="Consolas" panose="020B0609020204030204" pitchFamily="49" charset="0"/>
-              </a:rPr>
-              <a:t>timeout</a:t>
-            </a:r>
-            <a:r>
-              <a:rPr lang="en-US" b="0" dirty="0">
-                <a:solidFill>
-                  <a:srgbClr val="D4D4D4"/>
-                </a:solidFill>
-                <a:effectLst/>
-                <a:latin typeface="Consolas" panose="020B0609020204030204" pitchFamily="49" charset="0"/>
-              </a:rPr>
-              <a:t>)</a:t>
-            </a:r>
-            <a:endParaRPr lang="en-US" dirty="0"/>
-          </a:p>
-        </p:txBody>
-      </p:sp>
-    </p:spTree>
-    <p:extLst>
-      <p:ext uri="{BB962C8B-B14F-4D97-AF65-F5344CB8AC3E}">
-        <p14:creationId xmlns:p14="http://schemas.microsoft.com/office/powerpoint/2010/main" val="3699364540"/>
-      </p:ext>
-    </p:extLst>
-  </p:cSld>
-  <p:clrMapOvr>
-    <a:masterClrMapping/>
-  </p:clrMapOvr>
-</p:sld>
-</file>
-
-<file path=ppt/slides/slide8.xml><?xml version="1.0" encoding="utf-8"?>
-<p:sld xmlns:a="http://schemas.openxmlformats.org/drawingml/2006/main" xmlns:r="http://schemas.openxmlformats.org/officeDocument/2006/relationships" xmlns:p="http://schemas.openxmlformats.org/presentationml/2006/main">
-  <p:cSld>
-    <p:spTree>
-      <p:nvGrpSpPr>
-        <p:cNvPr id="1" name=""/>
-        <p:cNvGrpSpPr/>
-        <p:nvPr/>
-      </p:nvGrpSpPr>
-      <p:grpSpPr>
-        <a:xfrm>
-          <a:off x="0" y="0"/>
-          <a:ext cx="0" cy="0"/>
-          <a:chOff x="0" y="0"/>
-          <a:chExt cx="0" cy="0"/>
-        </a:xfrm>
-      </p:grpSpPr>
-      <p:sp>
-        <p:nvSpPr>
-          <p:cNvPr id="2" name="Title 1">
-            <a:extLst>
-              <a:ext uri="{FF2B5EF4-FFF2-40B4-BE49-F238E27FC236}">
-                <a16:creationId xmlns:a16="http://schemas.microsoft.com/office/drawing/2014/main" id="{09F4C2DE-1E97-4D6C-B924-24333C07B33A}"/>
-              </a:ext>
-            </a:extLst>
-          </p:cNvPr>
-          <p:cNvSpPr>
-            <a:spLocks noGrp="1"/>
-          </p:cNvSpPr>
-          <p:nvPr>
-            <p:ph type="title"/>
-          </p:nvPr>
-        </p:nvSpPr>
-        <p:spPr/>
-        <p:txBody>
-          <a:bodyPr/>
-          <a:lstStyle/>
-          <a:p>
-            <a:r>
-              <a:rPr lang="en-US" dirty="0" err="1"/>
-              <a:t>TrcPath</a:t>
-            </a:r>
-            <a:endParaRPr lang="en-US" dirty="0"/>
-          </a:p>
-        </p:txBody>
-      </p:sp>
-      <p:sp>
-        <p:nvSpPr>
-          <p:cNvPr id="3" name="Content Placeholder 2">
-            <a:extLst>
-              <a:ext uri="{FF2B5EF4-FFF2-40B4-BE49-F238E27FC236}">
-                <a16:creationId xmlns:a16="http://schemas.microsoft.com/office/drawing/2014/main" id="{EA1D6505-D893-49E8-8118-580F873467C0}"/>
-              </a:ext>
-            </a:extLst>
-          </p:cNvPr>
-          <p:cNvSpPr>
-            <a:spLocks noGrp="1"/>
-          </p:cNvSpPr>
-          <p:nvPr>
-            <p:ph idx="1"/>
-          </p:nvPr>
-        </p:nvSpPr>
-        <p:spPr>
-          <a:xfrm>
-            <a:off x="553673" y="2290195"/>
-            <a:ext cx="11039911" cy="4584583"/>
-          </a:xfrm>
-        </p:spPr>
-        <p:txBody>
-          <a:bodyPr>
-            <a:normAutofit fontScale="92500" lnSpcReduction="20000"/>
-          </a:bodyPr>
-          <a:lstStyle/>
-          <a:p>
-            <a:r>
-              <a:rPr lang="en-US" dirty="0" err="1"/>
-              <a:t>TrcPath</a:t>
-            </a:r>
-            <a:r>
-              <a:rPr lang="en-US" dirty="0"/>
-              <a:t> defines a path for the robot to follow and whether waypoint headings are in degrees or radians. A path is an array of waypoints.</a:t>
-            </a:r>
-          </a:p>
-          <a:p>
-            <a:r>
-              <a:rPr lang="en-US" dirty="0"/>
-              <a:t>A waypoint defines a point on the path and contains info such as:</a:t>
-            </a:r>
-          </a:p>
-          <a:p>
-            <a:pPr lvl="1"/>
-            <a:r>
-              <a:rPr lang="en-US" dirty="0"/>
-              <a:t>timestep – a timestamp relative to the starting time of the path. This is optional and is only required for a certain motion drive strategies (not needed by Pure Pursuit).</a:t>
-            </a:r>
-          </a:p>
-          <a:p>
-            <a:pPr lvl="1"/>
-            <a:r>
-              <a:rPr lang="en-US" b="1" dirty="0"/>
-              <a:t>pose</a:t>
-            </a:r>
-            <a:r>
-              <a:rPr lang="en-US" dirty="0"/>
-              <a:t> – location of the waypoint: X, Y and heading. This is always required for any motion drive strategies.</a:t>
-            </a:r>
-          </a:p>
-          <a:p>
-            <a:pPr lvl="1"/>
-            <a:r>
-              <a:rPr lang="en-US" dirty="0" err="1"/>
-              <a:t>encoderPosition</a:t>
-            </a:r>
-            <a:r>
-              <a:rPr lang="en-US" dirty="0"/>
-              <a:t> – specifies the encoder position at this waypoint (not needed by Pure Pursuit).</a:t>
-            </a:r>
-          </a:p>
-          <a:p>
-            <a:pPr lvl="1"/>
-            <a:r>
-              <a:rPr lang="en-US" dirty="0"/>
-              <a:t>velocity – specifies the tangential velocity of the robot at this waypoint (not needed by Pure Pursuit).</a:t>
-            </a:r>
-          </a:p>
-          <a:p>
-            <a:pPr lvl="1"/>
-            <a:r>
-              <a:rPr lang="en-US" dirty="0"/>
-              <a:t>acceleration – specifies the tangential acceleration of the robot at this waypoint (not needed by Pure Pursuit).</a:t>
-            </a:r>
-          </a:p>
-          <a:p>
-            <a:pPr lvl="1"/>
-            <a:r>
-              <a:rPr lang="en-US" dirty="0"/>
-              <a:t>jerk – specifies the jerk (derivative of acceleration) of the robot at this waypoint (not needed by Pure Pursuit).</a:t>
-            </a:r>
-          </a:p>
-          <a:p>
-            <a:r>
-              <a:rPr lang="en-US" dirty="0"/>
-              <a:t>There are two types of path:</a:t>
-            </a:r>
-          </a:p>
-          <a:p>
-            <a:pPr lvl="1"/>
-            <a:r>
-              <a:rPr lang="en-US" dirty="0"/>
-              <a:t>Absolute path: the location of each waypoint is an absolute position in a reference frame (usually the competition field).</a:t>
-            </a:r>
-          </a:p>
-          <a:p>
-            <a:pPr lvl="1"/>
-            <a:r>
-              <a:rPr lang="en-US" dirty="0"/>
-              <a:t>Incremental path: the location of each waypoint is a relative position from the previous waypoint on the path.</a:t>
-            </a:r>
-          </a:p>
-        </p:txBody>
-      </p:sp>
-    </p:spTree>
-    <p:extLst>
-      <p:ext uri="{BB962C8B-B14F-4D97-AF65-F5344CB8AC3E}">
-        <p14:creationId xmlns:p14="http://schemas.microsoft.com/office/powerpoint/2010/main" val="2656173237"/>
-      </p:ext>
-    </p:extLst>
-  </p:cSld>
-  <p:clrMapOvr>
-    <a:masterClrMapping/>
-  </p:clrMapOvr>
-</p:sld>
-</file>
-
-<file path=ppt/slides/slide9.xml><?xml version="1.0" encoding="utf-8"?>
-<p:sld xmlns:a="http://schemas.openxmlformats.org/drawingml/2006/main" xmlns:r="http://schemas.openxmlformats.org/officeDocument/2006/relationships" xmlns:p="http://schemas.openxmlformats.org/presentationml/2006/main">
-  <p:cSld>
-    <p:spTree>
-      <p:nvGrpSpPr>
-        <p:cNvPr id="1" name=""/>
-        <p:cNvGrpSpPr/>
-        <p:nvPr/>
-      </p:nvGrpSpPr>
-      <p:grpSpPr>
-        <a:xfrm>
-          <a:off x="0" y="0"/>
-          <a:ext cx="0" cy="0"/>
-          <a:chOff x="0" y="0"/>
-          <a:chExt cx="0" cy="0"/>
-        </a:xfrm>
-      </p:grpSpPr>
-      <p:sp>
-        <p:nvSpPr>
-          <p:cNvPr id="2" name="Title 1">
-            <a:extLst>
-              <a:ext uri="{FF2B5EF4-FFF2-40B4-BE49-F238E27FC236}">
-                <a16:creationId xmlns:a16="http://schemas.microsoft.com/office/drawing/2014/main" id="{09F4C2DE-1E97-4D6C-B924-24333C07B33A}"/>
-              </a:ext>
-            </a:extLst>
-          </p:cNvPr>
-          <p:cNvSpPr>
-            <a:spLocks noGrp="1"/>
-          </p:cNvSpPr>
-          <p:nvPr>
-            <p:ph type="title"/>
-          </p:nvPr>
-        </p:nvSpPr>
-        <p:spPr/>
-        <p:txBody>
-          <a:bodyPr/>
-          <a:lstStyle/>
-          <a:p>
-            <a:r>
-              <a:rPr lang="en-US" dirty="0" err="1"/>
-              <a:t>TrcPathBuilder</a:t>
-            </a:r>
-            <a:endParaRPr lang="en-US" dirty="0"/>
-          </a:p>
-        </p:txBody>
-      </p:sp>
-      <p:sp>
-        <p:nvSpPr>
-          <p:cNvPr id="3" name="Content Placeholder 2">
-            <a:extLst>
-              <a:ext uri="{FF2B5EF4-FFF2-40B4-BE49-F238E27FC236}">
-                <a16:creationId xmlns:a16="http://schemas.microsoft.com/office/drawing/2014/main" id="{EA1D6505-D893-49E8-8118-580F873467C0}"/>
-              </a:ext>
-            </a:extLst>
-          </p:cNvPr>
-          <p:cNvSpPr>
-            <a:spLocks noGrp="1"/>
-          </p:cNvSpPr>
-          <p:nvPr>
-            <p:ph idx="1"/>
-          </p:nvPr>
-        </p:nvSpPr>
-        <p:spPr>
-          <a:xfrm>
-            <a:off x="553673" y="2290195"/>
-            <a:ext cx="11039911" cy="4584583"/>
-          </a:xfrm>
-        </p:spPr>
-        <p:txBody>
-          <a:bodyPr>
-            <a:normAutofit fontScale="92500" lnSpcReduction="10000"/>
-          </a:bodyPr>
-          <a:lstStyle/>
-          <a:p>
-            <a:r>
-              <a:rPr lang="en-US" dirty="0" err="1"/>
-              <a:t>TrcPathBuilder</a:t>
-            </a:r>
-            <a:r>
-              <a:rPr lang="en-US" dirty="0"/>
-              <a:t> is a utility class that makes it easier to build paths for Pure Pursuit Drive.</a:t>
-            </a:r>
-          </a:p>
-          <a:p>
-            <a:r>
-              <a:rPr lang="en-US" dirty="0"/>
-              <a:t>Pure Pursuit Drive requires all waypoints relative to the first waypoint in the path.</a:t>
-            </a:r>
-          </a:p>
-          <a:p>
-            <a:r>
-              <a:rPr lang="en-US" dirty="0" err="1"/>
-              <a:t>TrcPathBuilder</a:t>
-            </a:r>
-            <a:r>
-              <a:rPr lang="en-US" dirty="0"/>
-              <a:t> can build such a path for Pure Pursuit from a field absolute path or an incremental path.</a:t>
-            </a:r>
-          </a:p>
-          <a:p>
-            <a:r>
-              <a:rPr lang="en-US" dirty="0" err="1"/>
-              <a:t>TrcPathBuilder</a:t>
-            </a:r>
-            <a:r>
-              <a:rPr lang="en-US" dirty="0"/>
-              <a:t> Constructor:</a:t>
-            </a:r>
-            <a:br>
-              <a:rPr lang="en-US" dirty="0"/>
-            </a:br>
-            <a:r>
-              <a:rPr lang="en-US" b="0" dirty="0" err="1">
-                <a:solidFill>
-                  <a:srgbClr val="DCDCAA"/>
-                </a:solidFill>
-                <a:effectLst/>
-                <a:latin typeface="Consolas" panose="020B0609020204030204" pitchFamily="49" charset="0"/>
-              </a:rPr>
-              <a:t>TrcPathBuilder</a:t>
-            </a:r>
-            <a:r>
-              <a:rPr lang="en-US" b="0" dirty="0">
-                <a:solidFill>
-                  <a:srgbClr val="D4D4D4"/>
-                </a:solidFill>
-                <a:effectLst/>
-                <a:latin typeface="Consolas" panose="020B0609020204030204" pitchFamily="49" charset="0"/>
-              </a:rPr>
-              <a:t>(</a:t>
-            </a:r>
-            <a:r>
-              <a:rPr lang="en-US" b="0" dirty="0">
-                <a:solidFill>
-                  <a:srgbClr val="4EC9B0"/>
-                </a:solidFill>
-                <a:effectLst/>
-                <a:latin typeface="Consolas" panose="020B0609020204030204" pitchFamily="49" charset="0"/>
-              </a:rPr>
-              <a:t>TrcPose2D</a:t>
-            </a:r>
-            <a:r>
-              <a:rPr lang="en-US" b="0" dirty="0">
-                <a:solidFill>
-                  <a:srgbClr val="D4D4D4"/>
-                </a:solidFill>
-                <a:effectLst/>
-                <a:latin typeface="Consolas" panose="020B0609020204030204" pitchFamily="49" charset="0"/>
-              </a:rPr>
-              <a:t> </a:t>
-            </a:r>
-            <a:r>
-              <a:rPr lang="en-US" b="0" dirty="0" err="1">
-                <a:solidFill>
-                  <a:srgbClr val="9CDCFE"/>
-                </a:solidFill>
-                <a:effectLst/>
-                <a:latin typeface="Consolas" panose="020B0609020204030204" pitchFamily="49" charset="0"/>
-              </a:rPr>
-              <a:t>startingPose</a:t>
-            </a:r>
-            <a:r>
-              <a:rPr lang="en-US" b="0" dirty="0">
-                <a:solidFill>
-                  <a:srgbClr val="D4D4D4"/>
-                </a:solidFill>
-                <a:effectLst/>
-                <a:latin typeface="Consolas" panose="020B0609020204030204" pitchFamily="49" charset="0"/>
-              </a:rPr>
-              <a:t>, </a:t>
-            </a:r>
-            <a:r>
-              <a:rPr lang="en-US" b="0" dirty="0" err="1">
-                <a:solidFill>
-                  <a:srgbClr val="4EC9B0"/>
-                </a:solidFill>
-                <a:effectLst/>
-                <a:latin typeface="Consolas" panose="020B0609020204030204" pitchFamily="49" charset="0"/>
-              </a:rPr>
-              <a:t>boolean</a:t>
-            </a:r>
-            <a:r>
-              <a:rPr lang="en-US" b="0" dirty="0">
-                <a:solidFill>
-                  <a:srgbClr val="D4D4D4"/>
-                </a:solidFill>
-                <a:effectLst/>
-                <a:latin typeface="Consolas" panose="020B0609020204030204" pitchFamily="49" charset="0"/>
-              </a:rPr>
-              <a:t> </a:t>
-            </a:r>
-            <a:r>
-              <a:rPr lang="en-US" b="0" dirty="0" err="1">
-                <a:solidFill>
-                  <a:srgbClr val="9CDCFE"/>
-                </a:solidFill>
-                <a:effectLst/>
-                <a:latin typeface="Consolas" panose="020B0609020204030204" pitchFamily="49" charset="0"/>
-              </a:rPr>
-              <a:t>incrementalPath</a:t>
-            </a:r>
-            <a:r>
-              <a:rPr lang="en-US" b="0" dirty="0">
-                <a:solidFill>
-                  <a:srgbClr val="D4D4D4"/>
-                </a:solidFill>
-                <a:effectLst/>
-                <a:latin typeface="Consolas" panose="020B0609020204030204" pitchFamily="49" charset="0"/>
-              </a:rPr>
-              <a:t>, </a:t>
-            </a:r>
-            <a:r>
-              <a:rPr lang="en-US" b="0" dirty="0" err="1">
-                <a:solidFill>
-                  <a:srgbClr val="4EC9B0"/>
-                </a:solidFill>
-                <a:effectLst/>
-                <a:latin typeface="Consolas" panose="020B0609020204030204" pitchFamily="49" charset="0"/>
-              </a:rPr>
-              <a:t>boolean</a:t>
-            </a:r>
-            <a:r>
-              <a:rPr lang="en-US" b="0" dirty="0">
-                <a:solidFill>
-                  <a:srgbClr val="D4D4D4"/>
-                </a:solidFill>
-                <a:effectLst/>
-                <a:latin typeface="Consolas" panose="020B0609020204030204" pitchFamily="49" charset="0"/>
-              </a:rPr>
-              <a:t> </a:t>
-            </a:r>
-            <a:r>
-              <a:rPr lang="en-US" b="0" dirty="0" err="1">
-                <a:solidFill>
-                  <a:srgbClr val="9CDCFE"/>
-                </a:solidFill>
-                <a:effectLst/>
-                <a:latin typeface="Consolas" panose="020B0609020204030204" pitchFamily="49" charset="0"/>
-              </a:rPr>
-              <a:t>inDegrees</a:t>
-            </a:r>
-            <a:r>
-              <a:rPr lang="en-US" b="0" dirty="0">
-                <a:solidFill>
-                  <a:srgbClr val="D4D4D4"/>
-                </a:solidFill>
-                <a:effectLst/>
-                <a:latin typeface="Consolas" panose="020B0609020204030204" pitchFamily="49" charset="0"/>
-              </a:rPr>
-              <a:t>)</a:t>
-            </a:r>
-            <a:endParaRPr lang="en-US" dirty="0"/>
-          </a:p>
-          <a:p>
-            <a:pPr lvl="1"/>
-            <a:r>
-              <a:rPr lang="en-US" dirty="0" err="1"/>
-              <a:t>startingPose</a:t>
-            </a:r>
-            <a:r>
-              <a:rPr lang="en-US" dirty="0"/>
-              <a:t> – absolution position of the robot at the start of the path (i.e. absolute field position of the robot).</a:t>
-            </a:r>
-          </a:p>
-          <a:p>
-            <a:pPr lvl="1"/>
-            <a:r>
-              <a:rPr lang="en-US" dirty="0" err="1"/>
-              <a:t>incrementalPath</a:t>
-            </a:r>
-            <a:r>
-              <a:rPr lang="en-US" dirty="0"/>
-              <a:t> – specifies whether the path is given as incremental path or absolute path.</a:t>
-            </a:r>
-          </a:p>
-          <a:p>
-            <a:pPr lvl="1"/>
-            <a:r>
-              <a:rPr lang="en-US" dirty="0" err="1"/>
-              <a:t>inDegrees</a:t>
-            </a:r>
-            <a:r>
-              <a:rPr lang="en-US" dirty="0"/>
-              <a:t> – specifies whether the waypoint headings are in degrees or radians.</a:t>
-            </a:r>
-          </a:p>
-          <a:p>
-            <a:r>
-              <a:rPr lang="en-US" dirty="0"/>
-              <a:t>Methods:</a:t>
-            </a:r>
-          </a:p>
-          <a:p>
-            <a:pPr lvl="1"/>
-            <a:r>
-              <a:rPr lang="en-US" dirty="0"/>
-              <a:t>append – append a point to the path (the point can be a waypoint or a pose).</a:t>
-            </a:r>
-          </a:p>
-          <a:p>
-            <a:pPr lvl="1"/>
-            <a:r>
-              <a:rPr lang="en-US" dirty="0" err="1"/>
-              <a:t>toPath</a:t>
-            </a:r>
-            <a:r>
-              <a:rPr lang="en-US" dirty="0"/>
-              <a:t> – returns a path that contains absolute waypoints in the reference frame.</a:t>
-            </a:r>
-          </a:p>
-          <a:p>
-            <a:pPr lvl="1"/>
-            <a:r>
-              <a:rPr lang="en-US" dirty="0" err="1"/>
-              <a:t>toRelativeStartPath</a:t>
-            </a:r>
-            <a:r>
-              <a:rPr lang="en-US" dirty="0"/>
-              <a:t> – returns a path that contains waypoints relative to the first waypoint of the path (this is the type of path Pure Pursuit needs).</a:t>
-            </a:r>
-          </a:p>
-        </p:txBody>
-      </p:sp>
-    </p:spTree>
-    <p:extLst>
-      <p:ext uri="{BB962C8B-B14F-4D97-AF65-F5344CB8AC3E}">
-        <p14:creationId xmlns:p14="http://schemas.microsoft.com/office/powerpoint/2010/main" val="3392496885"/>
       </p:ext>
     </p:extLst>
   </p:cSld>

</xml_diff>